<commit_message>
announce plus small graph changes
</commit_message>
<xml_diff>
--- a/slides/dailyAnnouncements.pptx
+++ b/slides/dailyAnnouncements.pptx
@@ -5,10 +5,10 @@
     <p:sldMasterId id="2147483728" r:id="rId1"/>
   </p:sldMasterIdLst>
   <p:notesMasterIdLst>
-    <p:notesMasterId r:id="rId7"/>
+    <p:notesMasterId r:id="rId8"/>
   </p:notesMasterIdLst>
   <p:handoutMasterIdLst>
-    <p:handoutMasterId r:id="rId8"/>
+    <p:handoutMasterId r:id="rId9"/>
   </p:handoutMasterIdLst>
   <p:sldIdLst>
     <p:sldId id="447" r:id="rId2"/>
@@ -16,11 +16,12 @@
     <p:sldId id="448" r:id="rId4"/>
     <p:sldId id="449" r:id="rId5"/>
     <p:sldId id="450" r:id="rId6"/>
+    <p:sldId id="451" r:id="rId7"/>
   </p:sldIdLst>
   <p:sldSz cx="9144000" cy="6858000" type="screen4x3"/>
   <p:notesSz cx="7315200" cy="9601200"/>
   <p:custDataLst>
-    <p:tags r:id="rId9"/>
+    <p:tags r:id="rId10"/>
   </p:custDataLst>
   <p:defaultTextStyle>
     <a:defPPr>
@@ -1020,7 +1021,7 @@
             <a:fld id="{E4886CB5-510A-4EF6-9466-BC7A8F0DDE87}" type="datetime1">
               <a:rPr lang="en-US" smtClean="0"/>
               <a:pPr/>
-              <a:t>1/24/20</a:t>
+              <a:t>1/27/20</a:t>
             </a:fld>
             <a:endParaRPr lang="en-US"/>
           </a:p>
@@ -1380,7 +1381,7 @@
             <a:fld id="{9B297853-24B4-4D05-83E4-0AD2E86C55E5}" type="datetime1">
               <a:rPr lang="en-US" smtClean="0"/>
               <a:pPr/>
-              <a:t>1/24/20</a:t>
+              <a:t>1/27/20</a:t>
             </a:fld>
             <a:endParaRPr lang="en-US"/>
           </a:p>
@@ -1556,7 +1557,7 @@
             <a:fld id="{01FCDD9E-5768-4705-9537-0C020B1BB310}" type="datetime1">
               <a:rPr lang="en-US" smtClean="0"/>
               <a:pPr/>
-              <a:t>1/24/20</a:t>
+              <a:t>1/27/20</a:t>
             </a:fld>
             <a:endParaRPr lang="en-US"/>
           </a:p>
@@ -1792,7 +1793,7 @@
             <a:fld id="{4257C27E-59C2-41CA-9776-94955CBEE440}" type="datetime1">
               <a:rPr lang="en-US" smtClean="0"/>
               <a:pPr/>
-              <a:t>1/24/20</a:t>
+              <a:t>1/27/20</a:t>
             </a:fld>
             <a:endParaRPr lang="en-US"/>
           </a:p>
@@ -2078,7 +2079,7 @@
             <a:fld id="{03180747-A137-49C6-9C74-AB7EE86F4904}" type="datetime1">
               <a:rPr lang="en-US" smtClean="0"/>
               <a:pPr/>
-              <a:t>1/24/20</a:t>
+              <a:t>1/27/20</a:t>
             </a:fld>
             <a:endParaRPr lang="en-US"/>
           </a:p>
@@ -2299,7 +2300,7 @@
             <a:fld id="{EBBA31D9-ADC1-480D-86A8-1EAFB6A86A35}" type="datetime1">
               <a:rPr lang="en-US" smtClean="0"/>
               <a:pPr/>
-              <a:t>1/24/20</a:t>
+              <a:t>1/27/20</a:t>
             </a:fld>
             <a:endParaRPr lang="en-US"/>
           </a:p>
@@ -2652,7 +2653,7 @@
             <a:fld id="{80AAE9AE-3B2F-4DEA-8C41-BDDF4CDF6F40}" type="datetime1">
               <a:rPr lang="en-US" smtClean="0"/>
               <a:pPr/>
-              <a:t>1/24/20</a:t>
+              <a:t>1/27/20</a:t>
             </a:fld>
             <a:endParaRPr lang="en-US"/>
           </a:p>
@@ -2885,7 +2886,7 @@
             <a:fld id="{48252F7F-E8FE-413B-8521-D4ED924C6DE5}" type="datetime1">
               <a:rPr lang="en-US" smtClean="0"/>
               <a:pPr/>
-              <a:t>1/24/20</a:t>
+              <a:t>1/27/20</a:t>
             </a:fld>
             <a:endParaRPr lang="en-US"/>
           </a:p>
@@ -3027,7 +3028,7 @@
             <a:fld id="{2FF1B124-70E3-4E4A-90E2-6B55DB7659B3}" type="datetime1">
               <a:rPr lang="en-US" smtClean="0"/>
               <a:pPr/>
-              <a:t>1/24/20</a:t>
+              <a:t>1/27/20</a:t>
             </a:fld>
             <a:endParaRPr lang="en-US"/>
           </a:p>
@@ -3305,7 +3306,7 @@
             <a:fld id="{4EBF4C98-3CD6-4C87-BD40-5718C2628835}" type="datetime1">
               <a:rPr lang="en-US" smtClean="0"/>
               <a:pPr/>
-              <a:t>1/24/20</a:t>
+              <a:t>1/27/20</a:t>
             </a:fld>
             <a:endParaRPr lang="en-US"/>
           </a:p>
@@ -3713,7 +3714,7 @@
             <a:fld id="{6D6408A8-6B1B-4CDA-875E-7BEECDBA31DF}" type="datetime1">
               <a:rPr lang="en-US" smtClean="0"/>
               <a:pPr/>
-              <a:t>1/24/20</a:t>
+              <a:t>1/27/20</a:t>
             </a:fld>
             <a:endParaRPr lang="en-US"/>
           </a:p>
@@ -4051,7 +4052,7 @@
             <a:fld id="{C55AAF07-D2F5-4B3C-B443-40DE8C337A77}" type="datetime1">
               <a:rPr lang="en-US" smtClean="0"/>
               <a:pPr/>
-              <a:t>1/24/20</a:t>
+              <a:t>1/27/20</a:t>
             </a:fld>
             <a:endParaRPr lang="en-US"/>
           </a:p>
@@ -5447,7 +5448,210 @@
 </p:sld>
 </file>
 
+<file path=ppt/slides/slide6.xml><?xml version="1.0" encoding="utf-8"?>
+<p:sld xmlns:a="http://schemas.openxmlformats.org/drawingml/2006/main" xmlns:r="http://schemas.openxmlformats.org/officeDocument/2006/relationships" xmlns:p="http://schemas.openxmlformats.org/presentationml/2006/main">
+  <p:cSld>
+    <p:spTree>
+      <p:nvGrpSpPr>
+        <p:cNvPr id="1" name=""/>
+        <p:cNvGrpSpPr/>
+        <p:nvPr/>
+      </p:nvGrpSpPr>
+      <p:grpSpPr>
+        <a:xfrm>
+          <a:off x="0" y="0"/>
+          <a:ext cx="0" cy="0"/>
+          <a:chOff x="0" y="0"/>
+          <a:chExt cx="0" cy="0"/>
+        </a:xfrm>
+      </p:grpSpPr>
+      <p:sp>
+        <p:nvSpPr>
+          <p:cNvPr id="6146" name="Rectangle 2"/>
+          <p:cNvSpPr>
+            <a:spLocks noGrp="1" noChangeArrowheads="1"/>
+          </p:cNvSpPr>
+          <p:nvPr>
+            <p:ph type="title"/>
+            <p:custDataLst>
+              <p:tags r:id="rId1"/>
+            </p:custDataLst>
+          </p:nvPr>
+        </p:nvSpPr>
+        <p:spPr/>
+        <p:txBody>
+          <a:bodyPr/>
+          <a:lstStyle/>
+          <a:p>
+            <a:pPr algn="ctr"/>
+            <a:r>
+              <a:rPr lang="en-US" dirty="0"/>
+              <a:t>Monday, January 27</a:t>
+            </a:r>
+          </a:p>
+        </p:txBody>
+      </p:sp>
+      <p:sp>
+        <p:nvSpPr>
+          <p:cNvPr id="6147" name="Rectangle 3"/>
+          <p:cNvSpPr>
+            <a:spLocks noGrp="1" noChangeArrowheads="1"/>
+          </p:cNvSpPr>
+          <p:nvPr>
+            <p:ph sz="quarter" idx="1"/>
+            <p:custDataLst>
+              <p:tags r:id="rId2"/>
+            </p:custDataLst>
+          </p:nvPr>
+        </p:nvSpPr>
+        <p:spPr>
+          <a:xfrm>
+            <a:off x="381000" y="1371600"/>
+            <a:ext cx="8255000" cy="4800600"/>
+          </a:xfrm>
+        </p:spPr>
+        <p:txBody>
+          <a:bodyPr>
+            <a:normAutofit/>
+          </a:bodyPr>
+          <a:lstStyle/>
+          <a:p>
+            <a:r>
+              <a:rPr lang="en-US" dirty="0"/>
+              <a:t>First </a:t>
+            </a:r>
+            <a:r>
+              <a:rPr lang="en-US" b="1" i="1" dirty="0"/>
+              <a:t>Quizzes</a:t>
+            </a:r>
+            <a:r>
+              <a:rPr lang="en-US" dirty="0"/>
+              <a:t> moved</a:t>
+            </a:r>
+          </a:p>
+          <a:p>
+            <a:pPr lvl="1"/>
+            <a:r>
+              <a:rPr lang="en-US" b="1" i="1" dirty="0"/>
+              <a:t>To this Wednesday. Don’t forget. </a:t>
+            </a:r>
+            <a:endParaRPr lang="en-US" dirty="0"/>
+          </a:p>
+          <a:p>
+            <a:r>
+              <a:rPr lang="en-US" b="1" i="1" dirty="0" err="1"/>
+              <a:t>Gradescope</a:t>
+            </a:r>
+            <a:r>
+              <a:rPr lang="en-US" dirty="0"/>
+              <a:t> appears to be working well so far</a:t>
+            </a:r>
+          </a:p>
+          <a:p>
+            <a:pPr lvl="1"/>
+            <a:r>
+              <a:rPr lang="en-US" dirty="0"/>
+              <a:t>A couple of small issues found and fixed already. </a:t>
+            </a:r>
+          </a:p>
+          <a:p>
+            <a:pPr lvl="1"/>
+            <a:r>
+              <a:rPr lang="en-US" dirty="0"/>
+              <a:t>How do you prefer due dates be set on there?</a:t>
+            </a:r>
+          </a:p>
+          <a:p>
+            <a:pPr lvl="1"/>
+            <a:r>
+              <a:rPr lang="en-US" dirty="0"/>
+              <a:t>Assignments will continue to appear on there.</a:t>
+            </a:r>
+          </a:p>
+          <a:p>
+            <a:r>
+              <a:rPr lang="en-US" dirty="0"/>
+              <a:t>Please join the class </a:t>
+            </a:r>
+            <a:r>
+              <a:rPr lang="en-US" b="1" i="1" dirty="0"/>
+              <a:t>Piazza</a:t>
+            </a:r>
+            <a:r>
+              <a:rPr lang="en-US" dirty="0"/>
+              <a:t> asap. </a:t>
+            </a:r>
+            <a:r>
+              <a:rPr lang="en-US" dirty="0" err="1"/>
+              <a:t>Tas</a:t>
+            </a:r>
+            <a:r>
+              <a:rPr lang="en-US" dirty="0"/>
+              <a:t> are posting common questions there.</a:t>
+            </a:r>
+          </a:p>
+          <a:p>
+            <a:r>
+              <a:rPr lang="en-US" dirty="0"/>
+              <a:t>Today we will continue discussing </a:t>
+            </a:r>
+            <a:r>
+              <a:rPr lang="en-US" b="1" i="1" dirty="0"/>
+              <a:t>advanced graphs</a:t>
+            </a:r>
+          </a:p>
+        </p:txBody>
+      </p:sp>
+      <p:sp>
+        <p:nvSpPr>
+          <p:cNvPr id="4" name="Slide Number Placeholder 3"/>
+          <p:cNvSpPr>
+            <a:spLocks noGrp="1"/>
+          </p:cNvSpPr>
+          <p:nvPr>
+            <p:ph type="sldNum" sz="quarter" idx="12"/>
+          </p:nvPr>
+        </p:nvSpPr>
+        <p:spPr/>
+        <p:txBody>
+          <a:bodyPr/>
+          <a:lstStyle/>
+          <a:p>
+            <a:fld id="{F26D9103-0C5C-48AC-B68E-3ED2C1647047}" type="slidenum">
+              <a:rPr lang="en-US" smtClean="0"/>
+              <a:pPr/>
+              <a:t>6</a:t>
+            </a:fld>
+            <a:endParaRPr lang="en-US" dirty="0"/>
+          </a:p>
+        </p:txBody>
+      </p:sp>
+    </p:spTree>
+    <p:extLst>
+      <p:ext uri="{BB962C8B-B14F-4D97-AF65-F5344CB8AC3E}">
+        <p14:creationId xmlns:p14="http://schemas.microsoft.com/office/powerpoint/2010/main" val="2940954650"/>
+      </p:ext>
+    </p:extLst>
+  </p:cSld>
+  <p:clrMapOvr>
+    <a:masterClrMapping/>
+  </p:clrMapOvr>
+</p:sld>
+</file>
+
 <file path=ppt/tags/tag1.xml><?xml version="1.0" encoding="utf-8"?>
+<p:tagLst xmlns:a="http://schemas.openxmlformats.org/drawingml/2006/main" xmlns:r="http://schemas.openxmlformats.org/officeDocument/2006/relationships" xmlns:p="http://schemas.openxmlformats.org/presentationml/2006/main">
+  <p:tag name="_INSTRUCTOR VIEW19C14C36-AC8E-43BC-9DB6-C2AAF774C7DC|PANE__TAG" val="_"/>
+</p:tagLst>
+</file>
+
+<file path=ppt/tags/tag10.xml><?xml version="1.0" encoding="utf-8"?>
+<p:tagLst xmlns:a="http://schemas.openxmlformats.org/drawingml/2006/main" xmlns:r="http://schemas.openxmlformats.org/officeDocument/2006/relationships" xmlns:p="http://schemas.openxmlformats.org/presentationml/2006/main">
+  <p:tag name="_INSTRUCTOR VIEW19C14C36-AC8E-43BC-9DB6-C2AAF774C7DC|PANE__TAG" val="_"/>
+</p:tagLst>
+</file>
+
+<file path=ppt/tags/tag11.xml><?xml version="1.0" encoding="utf-8"?>
 <p:tagLst xmlns:a="http://schemas.openxmlformats.org/drawingml/2006/main" xmlns:r="http://schemas.openxmlformats.org/officeDocument/2006/relationships" xmlns:p="http://schemas.openxmlformats.org/presentationml/2006/main">
   <p:tag name="_INSTRUCTOR VIEW19C14C36-AC8E-43BC-9DB6-C2AAF774C7DC|PANE__TAG" val="_"/>
 </p:tagLst>

</xml_diff>

<commit_message>
daily announcements and adding some more TA OH
</commit_message>
<xml_diff>
--- a/slides/dailyAnnouncements.pptx
+++ b/slides/dailyAnnouncements.pptx
@@ -5,10 +5,10 @@
     <p:sldMasterId id="2147483728" r:id="rId1"/>
   </p:sldMasterIdLst>
   <p:notesMasterIdLst>
-    <p:notesMasterId r:id="rId8"/>
+    <p:notesMasterId r:id="rId9"/>
   </p:notesMasterIdLst>
   <p:handoutMasterIdLst>
-    <p:handoutMasterId r:id="rId9"/>
+    <p:handoutMasterId r:id="rId10"/>
   </p:handoutMasterIdLst>
   <p:sldIdLst>
     <p:sldId id="447" r:id="rId2"/>
@@ -17,11 +17,12 @@
     <p:sldId id="449" r:id="rId5"/>
     <p:sldId id="450" r:id="rId6"/>
     <p:sldId id="451" r:id="rId7"/>
+    <p:sldId id="452" r:id="rId8"/>
   </p:sldIdLst>
   <p:sldSz cx="9144000" cy="6858000" type="screen4x3"/>
   <p:notesSz cx="7315200" cy="9601200"/>
   <p:custDataLst>
-    <p:tags r:id="rId10"/>
+    <p:tags r:id="rId11"/>
   </p:custDataLst>
   <p:defaultTextStyle>
     <a:defPPr>
@@ -1021,7 +1022,7 @@
             <a:fld id="{E4886CB5-510A-4EF6-9466-BC7A8F0DDE87}" type="datetime1">
               <a:rPr lang="en-US" smtClean="0"/>
               <a:pPr/>
-              <a:t>1/27/20</a:t>
+              <a:t>1/29/20</a:t>
             </a:fld>
             <a:endParaRPr lang="en-US"/>
           </a:p>
@@ -1381,7 +1382,7 @@
             <a:fld id="{9B297853-24B4-4D05-83E4-0AD2E86C55E5}" type="datetime1">
               <a:rPr lang="en-US" smtClean="0"/>
               <a:pPr/>
-              <a:t>1/27/20</a:t>
+              <a:t>1/29/20</a:t>
             </a:fld>
             <a:endParaRPr lang="en-US"/>
           </a:p>
@@ -1557,7 +1558,7 @@
             <a:fld id="{01FCDD9E-5768-4705-9537-0C020B1BB310}" type="datetime1">
               <a:rPr lang="en-US" smtClean="0"/>
               <a:pPr/>
-              <a:t>1/27/20</a:t>
+              <a:t>1/29/20</a:t>
             </a:fld>
             <a:endParaRPr lang="en-US"/>
           </a:p>
@@ -1793,7 +1794,7 @@
             <a:fld id="{4257C27E-59C2-41CA-9776-94955CBEE440}" type="datetime1">
               <a:rPr lang="en-US" smtClean="0"/>
               <a:pPr/>
-              <a:t>1/27/20</a:t>
+              <a:t>1/29/20</a:t>
             </a:fld>
             <a:endParaRPr lang="en-US"/>
           </a:p>
@@ -2079,7 +2080,7 @@
             <a:fld id="{03180747-A137-49C6-9C74-AB7EE86F4904}" type="datetime1">
               <a:rPr lang="en-US" smtClean="0"/>
               <a:pPr/>
-              <a:t>1/27/20</a:t>
+              <a:t>1/29/20</a:t>
             </a:fld>
             <a:endParaRPr lang="en-US"/>
           </a:p>
@@ -2300,7 +2301,7 @@
             <a:fld id="{EBBA31D9-ADC1-480D-86A8-1EAFB6A86A35}" type="datetime1">
               <a:rPr lang="en-US" smtClean="0"/>
               <a:pPr/>
-              <a:t>1/27/20</a:t>
+              <a:t>1/29/20</a:t>
             </a:fld>
             <a:endParaRPr lang="en-US"/>
           </a:p>
@@ -2653,7 +2654,7 @@
             <a:fld id="{80AAE9AE-3B2F-4DEA-8C41-BDDF4CDF6F40}" type="datetime1">
               <a:rPr lang="en-US" smtClean="0"/>
               <a:pPr/>
-              <a:t>1/27/20</a:t>
+              <a:t>1/29/20</a:t>
             </a:fld>
             <a:endParaRPr lang="en-US"/>
           </a:p>
@@ -2886,7 +2887,7 @@
             <a:fld id="{48252F7F-E8FE-413B-8521-D4ED924C6DE5}" type="datetime1">
               <a:rPr lang="en-US" smtClean="0"/>
               <a:pPr/>
-              <a:t>1/27/20</a:t>
+              <a:t>1/29/20</a:t>
             </a:fld>
             <a:endParaRPr lang="en-US"/>
           </a:p>
@@ -3028,7 +3029,7 @@
             <a:fld id="{2FF1B124-70E3-4E4A-90E2-6B55DB7659B3}" type="datetime1">
               <a:rPr lang="en-US" smtClean="0"/>
               <a:pPr/>
-              <a:t>1/27/20</a:t>
+              <a:t>1/29/20</a:t>
             </a:fld>
             <a:endParaRPr lang="en-US"/>
           </a:p>
@@ -3306,7 +3307,7 @@
             <a:fld id="{4EBF4C98-3CD6-4C87-BD40-5718C2628835}" type="datetime1">
               <a:rPr lang="en-US" smtClean="0"/>
               <a:pPr/>
-              <a:t>1/27/20</a:t>
+              <a:t>1/29/20</a:t>
             </a:fld>
             <a:endParaRPr lang="en-US"/>
           </a:p>
@@ -3714,7 +3715,7 @@
             <a:fld id="{6D6408A8-6B1B-4CDA-875E-7BEECDBA31DF}" type="datetime1">
               <a:rPr lang="en-US" smtClean="0"/>
               <a:pPr/>
-              <a:t>1/27/20</a:t>
+              <a:t>1/29/20</a:t>
             </a:fld>
             <a:endParaRPr lang="en-US"/>
           </a:p>
@@ -4052,7 +4053,7 @@
             <a:fld id="{C55AAF07-D2F5-4B3C-B443-40DE8C337A77}" type="datetime1">
               <a:rPr lang="en-US" smtClean="0"/>
               <a:pPr/>
-              <a:t>1/27/20</a:t>
+              <a:t>1/29/20</a:t>
             </a:fld>
             <a:endParaRPr lang="en-US"/>
           </a:p>
@@ -5639,6 +5640,190 @@
 </p:sld>
 </file>
 
+<file path=ppt/slides/slide7.xml><?xml version="1.0" encoding="utf-8"?>
+<p:sld xmlns:a="http://schemas.openxmlformats.org/drawingml/2006/main" xmlns:r="http://schemas.openxmlformats.org/officeDocument/2006/relationships" xmlns:p="http://schemas.openxmlformats.org/presentationml/2006/main">
+  <p:cSld>
+    <p:spTree>
+      <p:nvGrpSpPr>
+        <p:cNvPr id="1" name=""/>
+        <p:cNvGrpSpPr/>
+        <p:nvPr/>
+      </p:nvGrpSpPr>
+      <p:grpSpPr>
+        <a:xfrm>
+          <a:off x="0" y="0"/>
+          <a:ext cx="0" cy="0"/>
+          <a:chOff x="0" y="0"/>
+          <a:chExt cx="0" cy="0"/>
+        </a:xfrm>
+      </p:grpSpPr>
+      <p:sp>
+        <p:nvSpPr>
+          <p:cNvPr id="6146" name="Rectangle 2"/>
+          <p:cNvSpPr>
+            <a:spLocks noGrp="1" noChangeArrowheads="1"/>
+          </p:cNvSpPr>
+          <p:nvPr>
+            <p:ph type="title"/>
+            <p:custDataLst>
+              <p:tags r:id="rId1"/>
+            </p:custDataLst>
+          </p:nvPr>
+        </p:nvSpPr>
+        <p:spPr/>
+        <p:txBody>
+          <a:bodyPr/>
+          <a:lstStyle/>
+          <a:p>
+            <a:pPr algn="ctr"/>
+            <a:r>
+              <a:rPr lang="en-US" dirty="0"/>
+              <a:t>Wednesday, January 29</a:t>
+            </a:r>
+          </a:p>
+        </p:txBody>
+      </p:sp>
+      <p:sp>
+        <p:nvSpPr>
+          <p:cNvPr id="6147" name="Rectangle 3"/>
+          <p:cNvSpPr>
+            <a:spLocks noGrp="1" noChangeArrowheads="1"/>
+          </p:cNvSpPr>
+          <p:nvPr>
+            <p:ph sz="quarter" idx="1"/>
+            <p:custDataLst>
+              <p:tags r:id="rId2"/>
+            </p:custDataLst>
+          </p:nvPr>
+        </p:nvSpPr>
+        <p:spPr>
+          <a:xfrm>
+            <a:off x="381000" y="1371600"/>
+            <a:ext cx="8255000" cy="4800600"/>
+          </a:xfrm>
+        </p:spPr>
+        <p:txBody>
+          <a:bodyPr>
+            <a:normAutofit/>
+          </a:bodyPr>
+          <a:lstStyle/>
+          <a:p>
+            <a:r>
+              <a:rPr lang="en-US" dirty="0"/>
+              <a:t>First </a:t>
+            </a:r>
+            <a:r>
+              <a:rPr lang="en-US" b="1" i="1" dirty="0"/>
+              <a:t>Quizzes</a:t>
+            </a:r>
+            <a:r>
+              <a:rPr lang="en-US" dirty="0"/>
+              <a:t> are today!</a:t>
+            </a:r>
+          </a:p>
+          <a:p>
+            <a:r>
+              <a:rPr lang="en-US" b="1" i="1" dirty="0" err="1"/>
+              <a:t>Gradescope</a:t>
+            </a:r>
+            <a:r>
+              <a:rPr lang="en-US" dirty="0"/>
+              <a:t> appears to be working well so far</a:t>
+            </a:r>
+          </a:p>
+          <a:p>
+            <a:pPr lvl="1"/>
+            <a:r>
+              <a:rPr lang="en-US" dirty="0"/>
+              <a:t>Board game: Changed description of input slightly.</a:t>
+            </a:r>
+          </a:p>
+          <a:p>
+            <a:pPr lvl="1"/>
+            <a:r>
+              <a:rPr lang="en-US" dirty="0"/>
+              <a:t>Will change the due dates on those very very soon. </a:t>
+            </a:r>
+          </a:p>
+          <a:p>
+            <a:r>
+              <a:rPr lang="en-US" dirty="0"/>
+              <a:t>Please join the class </a:t>
+            </a:r>
+            <a:r>
+              <a:rPr lang="en-US" b="1" i="1" dirty="0"/>
+              <a:t>Piazza</a:t>
+            </a:r>
+            <a:r>
+              <a:rPr lang="en-US" dirty="0"/>
+              <a:t> asap. </a:t>
+            </a:r>
+            <a:r>
+              <a:rPr lang="en-US" dirty="0" err="1"/>
+              <a:t>Tas</a:t>
+            </a:r>
+            <a:r>
+              <a:rPr lang="en-US" dirty="0"/>
+              <a:t> are posting common questions there.</a:t>
+            </a:r>
+          </a:p>
+          <a:p>
+            <a:r>
+              <a:rPr lang="en-US" dirty="0"/>
+              <a:t>Today we will continue and </a:t>
+            </a:r>
+            <a:r>
+              <a:rPr lang="en-US"/>
+              <a:t>possibly finish </a:t>
+            </a:r>
+            <a:r>
+              <a:rPr lang="en-US" dirty="0"/>
+              <a:t>discussing </a:t>
+            </a:r>
+            <a:r>
+              <a:rPr lang="en-US" b="1" i="1" dirty="0"/>
+              <a:t>advanced graphs</a:t>
+            </a:r>
+          </a:p>
+        </p:txBody>
+      </p:sp>
+      <p:sp>
+        <p:nvSpPr>
+          <p:cNvPr id="4" name="Slide Number Placeholder 3"/>
+          <p:cNvSpPr>
+            <a:spLocks noGrp="1"/>
+          </p:cNvSpPr>
+          <p:nvPr>
+            <p:ph type="sldNum" sz="quarter" idx="12"/>
+          </p:nvPr>
+        </p:nvSpPr>
+        <p:spPr/>
+        <p:txBody>
+          <a:bodyPr/>
+          <a:lstStyle/>
+          <a:p>
+            <a:fld id="{F26D9103-0C5C-48AC-B68E-3ED2C1647047}" type="slidenum">
+              <a:rPr lang="en-US" smtClean="0"/>
+              <a:pPr/>
+              <a:t>7</a:t>
+            </a:fld>
+            <a:endParaRPr lang="en-US" dirty="0"/>
+          </a:p>
+        </p:txBody>
+      </p:sp>
+    </p:spTree>
+    <p:extLst>
+      <p:ext uri="{BB962C8B-B14F-4D97-AF65-F5344CB8AC3E}">
+        <p14:creationId xmlns:p14="http://schemas.microsoft.com/office/powerpoint/2010/main" val="3818437322"/>
+      </p:ext>
+    </p:extLst>
+  </p:cSld>
+  <p:clrMapOvr>
+    <a:masterClrMapping/>
+  </p:clrMapOvr>
+</p:sld>
+</file>
+
 <file path=ppt/tags/tag1.xml><?xml version="1.0" encoding="utf-8"?>
 <p:tagLst xmlns:a="http://schemas.openxmlformats.org/drawingml/2006/main" xmlns:r="http://schemas.openxmlformats.org/officeDocument/2006/relationships" xmlns:p="http://schemas.openxmlformats.org/presentationml/2006/main">
   <p:tag name="_INSTRUCTOR VIEW19C14C36-AC8E-43BC-9DB6-C2AAF774C7DC|PANE__TAG" val="_"/>
@@ -5652,6 +5837,18 @@
 </file>
 
 <file path=ppt/tags/tag11.xml><?xml version="1.0" encoding="utf-8"?>
+<p:tagLst xmlns:a="http://schemas.openxmlformats.org/drawingml/2006/main" xmlns:r="http://schemas.openxmlformats.org/officeDocument/2006/relationships" xmlns:p="http://schemas.openxmlformats.org/presentationml/2006/main">
+  <p:tag name="_INSTRUCTOR VIEW19C14C36-AC8E-43BC-9DB6-C2AAF774C7DC|PANE__TAG" val="_"/>
+</p:tagLst>
+</file>
+
+<file path=ppt/tags/tag12.xml><?xml version="1.0" encoding="utf-8"?>
+<p:tagLst xmlns:a="http://schemas.openxmlformats.org/drawingml/2006/main" xmlns:r="http://schemas.openxmlformats.org/officeDocument/2006/relationships" xmlns:p="http://schemas.openxmlformats.org/presentationml/2006/main">
+  <p:tag name="_INSTRUCTOR VIEW19C14C36-AC8E-43BC-9DB6-C2AAF774C7DC|PANE__TAG" val="_"/>
+</p:tagLst>
+</file>
+
+<file path=ppt/tags/tag13.xml><?xml version="1.0" encoding="utf-8"?>
 <p:tagLst xmlns:a="http://schemas.openxmlformats.org/drawingml/2006/main" xmlns:r="http://schemas.openxmlformats.org/officeDocument/2006/relationships" xmlns:p="http://schemas.openxmlformats.org/presentationml/2006/main">
   <p:tag name="_INSTRUCTOR VIEW19C14C36-AC8E-43BC-9DB6-C2AAF774C7DC|PANE__TAG" val="_"/>
 </p:tagLst>

</xml_diff>

<commit_message>
announcements and schedule reshuffle
</commit_message>
<xml_diff>
--- a/slides/dailyAnnouncements.pptx
+++ b/slides/dailyAnnouncements.pptx
@@ -5,10 +5,10 @@
     <p:sldMasterId id="2147483728" r:id="rId1"/>
   </p:sldMasterIdLst>
   <p:notesMasterIdLst>
-    <p:notesMasterId r:id="rId9"/>
+    <p:notesMasterId r:id="rId11"/>
   </p:notesMasterIdLst>
   <p:handoutMasterIdLst>
-    <p:handoutMasterId r:id="rId10"/>
+    <p:handoutMasterId r:id="rId12"/>
   </p:handoutMasterIdLst>
   <p:sldIdLst>
     <p:sldId id="447" r:id="rId2"/>
@@ -18,11 +18,13 @@
     <p:sldId id="450" r:id="rId6"/>
     <p:sldId id="451" r:id="rId7"/>
     <p:sldId id="452" r:id="rId8"/>
+    <p:sldId id="453" r:id="rId9"/>
+    <p:sldId id="454" r:id="rId10"/>
   </p:sldIdLst>
   <p:sldSz cx="9144000" cy="6858000" type="screen4x3"/>
   <p:notesSz cx="7315200" cy="9601200"/>
   <p:custDataLst>
-    <p:tags r:id="rId11"/>
+    <p:tags r:id="rId13"/>
   </p:custDataLst>
   <p:defaultTextStyle>
     <a:defPPr>
@@ -1022,7 +1024,7 @@
             <a:fld id="{E4886CB5-510A-4EF6-9466-BC7A8F0DDE87}" type="datetime1">
               <a:rPr lang="en-US" smtClean="0"/>
               <a:pPr/>
-              <a:t>1/29/20</a:t>
+              <a:t>2/3/20</a:t>
             </a:fld>
             <a:endParaRPr lang="en-US"/>
           </a:p>
@@ -1382,7 +1384,7 @@
             <a:fld id="{9B297853-24B4-4D05-83E4-0AD2E86C55E5}" type="datetime1">
               <a:rPr lang="en-US" smtClean="0"/>
               <a:pPr/>
-              <a:t>1/29/20</a:t>
+              <a:t>2/3/20</a:t>
             </a:fld>
             <a:endParaRPr lang="en-US"/>
           </a:p>
@@ -1558,7 +1560,7 @@
             <a:fld id="{01FCDD9E-5768-4705-9537-0C020B1BB310}" type="datetime1">
               <a:rPr lang="en-US" smtClean="0"/>
               <a:pPr/>
-              <a:t>1/29/20</a:t>
+              <a:t>2/3/20</a:t>
             </a:fld>
             <a:endParaRPr lang="en-US"/>
           </a:p>
@@ -1794,7 +1796,7 @@
             <a:fld id="{4257C27E-59C2-41CA-9776-94955CBEE440}" type="datetime1">
               <a:rPr lang="en-US" smtClean="0"/>
               <a:pPr/>
-              <a:t>1/29/20</a:t>
+              <a:t>2/3/20</a:t>
             </a:fld>
             <a:endParaRPr lang="en-US"/>
           </a:p>
@@ -2080,7 +2082,7 @@
             <a:fld id="{03180747-A137-49C6-9C74-AB7EE86F4904}" type="datetime1">
               <a:rPr lang="en-US" smtClean="0"/>
               <a:pPr/>
-              <a:t>1/29/20</a:t>
+              <a:t>2/3/20</a:t>
             </a:fld>
             <a:endParaRPr lang="en-US"/>
           </a:p>
@@ -2301,7 +2303,7 @@
             <a:fld id="{EBBA31D9-ADC1-480D-86A8-1EAFB6A86A35}" type="datetime1">
               <a:rPr lang="en-US" smtClean="0"/>
               <a:pPr/>
-              <a:t>1/29/20</a:t>
+              <a:t>2/3/20</a:t>
             </a:fld>
             <a:endParaRPr lang="en-US"/>
           </a:p>
@@ -2654,7 +2656,7 @@
             <a:fld id="{80AAE9AE-3B2F-4DEA-8C41-BDDF4CDF6F40}" type="datetime1">
               <a:rPr lang="en-US" smtClean="0"/>
               <a:pPr/>
-              <a:t>1/29/20</a:t>
+              <a:t>2/3/20</a:t>
             </a:fld>
             <a:endParaRPr lang="en-US"/>
           </a:p>
@@ -2887,7 +2889,7 @@
             <a:fld id="{48252F7F-E8FE-413B-8521-D4ED924C6DE5}" type="datetime1">
               <a:rPr lang="en-US" smtClean="0"/>
               <a:pPr/>
-              <a:t>1/29/20</a:t>
+              <a:t>2/3/20</a:t>
             </a:fld>
             <a:endParaRPr lang="en-US"/>
           </a:p>
@@ -3029,7 +3031,7 @@
             <a:fld id="{2FF1B124-70E3-4E4A-90E2-6B55DB7659B3}" type="datetime1">
               <a:rPr lang="en-US" smtClean="0"/>
               <a:pPr/>
-              <a:t>1/29/20</a:t>
+              <a:t>2/3/20</a:t>
             </a:fld>
             <a:endParaRPr lang="en-US"/>
           </a:p>
@@ -3307,7 +3309,7 @@
             <a:fld id="{4EBF4C98-3CD6-4C87-BD40-5718C2628835}" type="datetime1">
               <a:rPr lang="en-US" smtClean="0"/>
               <a:pPr/>
-              <a:t>1/29/20</a:t>
+              <a:t>2/3/20</a:t>
             </a:fld>
             <a:endParaRPr lang="en-US"/>
           </a:p>
@@ -3715,7 +3717,7 @@
             <a:fld id="{6D6408A8-6B1B-4CDA-875E-7BEECDBA31DF}" type="datetime1">
               <a:rPr lang="en-US" smtClean="0"/>
               <a:pPr/>
-              <a:t>1/29/20</a:t>
+              <a:t>2/3/20</a:t>
             </a:fld>
             <a:endParaRPr lang="en-US"/>
           </a:p>
@@ -4053,7 +4055,7 @@
             <a:fld id="{C55AAF07-D2F5-4B3C-B443-40DE8C337A77}" type="datetime1">
               <a:rPr lang="en-US" smtClean="0"/>
               <a:pPr/>
-              <a:t>1/29/20</a:t>
+              <a:t>2/3/20</a:t>
             </a:fld>
             <a:endParaRPr lang="en-US"/>
           </a:p>
@@ -5824,6 +5826,399 @@
 </p:sld>
 </file>
 
+<file path=ppt/slides/slide8.xml><?xml version="1.0" encoding="utf-8"?>
+<p:sld xmlns:a="http://schemas.openxmlformats.org/drawingml/2006/main" xmlns:r="http://schemas.openxmlformats.org/officeDocument/2006/relationships" xmlns:p="http://schemas.openxmlformats.org/presentationml/2006/main">
+  <p:cSld>
+    <p:spTree>
+      <p:nvGrpSpPr>
+        <p:cNvPr id="1" name=""/>
+        <p:cNvGrpSpPr/>
+        <p:nvPr/>
+      </p:nvGrpSpPr>
+      <p:grpSpPr>
+        <a:xfrm>
+          <a:off x="0" y="0"/>
+          <a:ext cx="0" cy="0"/>
+          <a:chOff x="0" y="0"/>
+          <a:chExt cx="0" cy="0"/>
+        </a:xfrm>
+      </p:grpSpPr>
+      <p:sp>
+        <p:nvSpPr>
+          <p:cNvPr id="6146" name="Rectangle 2"/>
+          <p:cNvSpPr>
+            <a:spLocks noGrp="1" noChangeArrowheads="1"/>
+          </p:cNvSpPr>
+          <p:nvPr>
+            <p:ph type="title"/>
+            <p:custDataLst>
+              <p:tags r:id="rId1"/>
+            </p:custDataLst>
+          </p:nvPr>
+        </p:nvSpPr>
+        <p:spPr/>
+        <p:txBody>
+          <a:bodyPr/>
+          <a:lstStyle/>
+          <a:p>
+            <a:pPr algn="ctr"/>
+            <a:r>
+              <a:rPr lang="en-US" dirty="0"/>
+              <a:t>Friday, January 31</a:t>
+            </a:r>
+          </a:p>
+        </p:txBody>
+      </p:sp>
+      <p:sp>
+        <p:nvSpPr>
+          <p:cNvPr id="6147" name="Rectangle 3"/>
+          <p:cNvSpPr>
+            <a:spLocks noGrp="1" noChangeArrowheads="1"/>
+          </p:cNvSpPr>
+          <p:nvPr>
+            <p:ph sz="quarter" idx="1"/>
+            <p:custDataLst>
+              <p:tags r:id="rId2"/>
+            </p:custDataLst>
+          </p:nvPr>
+        </p:nvSpPr>
+        <p:spPr>
+          <a:xfrm>
+            <a:off x="381000" y="1371600"/>
+            <a:ext cx="8255000" cy="4800600"/>
+          </a:xfrm>
+        </p:spPr>
+        <p:txBody>
+          <a:bodyPr>
+            <a:normAutofit/>
+          </a:bodyPr>
+          <a:lstStyle/>
+          <a:p>
+            <a:r>
+              <a:rPr lang="en-US" dirty="0"/>
+              <a:t>First </a:t>
+            </a:r>
+            <a:r>
+              <a:rPr lang="en-US" b="1" i="1" dirty="0"/>
+              <a:t>Quizzes</a:t>
+            </a:r>
+            <a:r>
+              <a:rPr lang="en-US" dirty="0"/>
+              <a:t> are being graded!</a:t>
+            </a:r>
+          </a:p>
+          <a:p>
+            <a:pPr lvl="1"/>
+            <a:r>
+              <a:rPr lang="en-US" dirty="0"/>
+              <a:t>Should be back to you by end of weekend at latest.</a:t>
+            </a:r>
+          </a:p>
+          <a:p>
+            <a:r>
+              <a:rPr lang="en-US" b="1" i="1" dirty="0" err="1"/>
+              <a:t>Gradescope</a:t>
+            </a:r>
+            <a:r>
+              <a:rPr lang="en-US" dirty="0"/>
+              <a:t> appears to be working well so far</a:t>
+            </a:r>
+          </a:p>
+          <a:p>
+            <a:pPr lvl="1"/>
+            <a:r>
+              <a:rPr lang="en-US" dirty="0"/>
+              <a:t>Many more assignments have been getting added</a:t>
+            </a:r>
+          </a:p>
+          <a:p>
+            <a:pPr lvl="1"/>
+            <a:r>
+              <a:rPr lang="en-US" dirty="0"/>
+              <a:t>Recommended due dates have been set</a:t>
+            </a:r>
+          </a:p>
+          <a:p>
+            <a:pPr lvl="1"/>
+            <a:r>
+              <a:rPr lang="en-US" dirty="0"/>
+              <a:t>Any other issues anyone is having?</a:t>
+            </a:r>
+          </a:p>
+          <a:p>
+            <a:r>
+              <a:rPr lang="en-US" dirty="0"/>
+              <a:t>Please join the class </a:t>
+            </a:r>
+            <a:r>
+              <a:rPr lang="en-US" b="1" i="1" dirty="0"/>
+              <a:t>Piazza</a:t>
+            </a:r>
+            <a:r>
+              <a:rPr lang="en-US" dirty="0"/>
+              <a:t> asap. </a:t>
+            </a:r>
+            <a:r>
+              <a:rPr lang="en-US" dirty="0" err="1"/>
+              <a:t>Tas</a:t>
+            </a:r>
+            <a:r>
+              <a:rPr lang="en-US" dirty="0"/>
+              <a:t> are posting common questions there.</a:t>
+            </a:r>
+          </a:p>
+          <a:p>
+            <a:r>
+              <a:rPr lang="en-US" dirty="0"/>
+              <a:t>Today we will continue and hopefully finish discussing </a:t>
+            </a:r>
+            <a:r>
+              <a:rPr lang="en-US" b="1" i="1" dirty="0"/>
+              <a:t>advanced graphs</a:t>
+            </a:r>
+          </a:p>
+        </p:txBody>
+      </p:sp>
+      <p:sp>
+        <p:nvSpPr>
+          <p:cNvPr id="4" name="Slide Number Placeholder 3"/>
+          <p:cNvSpPr>
+            <a:spLocks noGrp="1"/>
+          </p:cNvSpPr>
+          <p:nvPr>
+            <p:ph type="sldNum" sz="quarter" idx="12"/>
+          </p:nvPr>
+        </p:nvSpPr>
+        <p:spPr/>
+        <p:txBody>
+          <a:bodyPr/>
+          <a:lstStyle/>
+          <a:p>
+            <a:fld id="{F26D9103-0C5C-48AC-B68E-3ED2C1647047}" type="slidenum">
+              <a:rPr lang="en-US" smtClean="0"/>
+              <a:pPr/>
+              <a:t>8</a:t>
+            </a:fld>
+            <a:endParaRPr lang="en-US" dirty="0"/>
+          </a:p>
+        </p:txBody>
+      </p:sp>
+    </p:spTree>
+    <p:extLst>
+      <p:ext uri="{BB962C8B-B14F-4D97-AF65-F5344CB8AC3E}">
+        <p14:creationId xmlns:p14="http://schemas.microsoft.com/office/powerpoint/2010/main" val="345869947"/>
+      </p:ext>
+    </p:extLst>
+  </p:cSld>
+  <p:clrMapOvr>
+    <a:masterClrMapping/>
+  </p:clrMapOvr>
+</p:sld>
+</file>
+
+<file path=ppt/slides/slide9.xml><?xml version="1.0" encoding="utf-8"?>
+<p:sld xmlns:a="http://schemas.openxmlformats.org/drawingml/2006/main" xmlns:r="http://schemas.openxmlformats.org/officeDocument/2006/relationships" xmlns:p="http://schemas.openxmlformats.org/presentationml/2006/main">
+  <p:cSld>
+    <p:spTree>
+      <p:nvGrpSpPr>
+        <p:cNvPr id="1" name=""/>
+        <p:cNvGrpSpPr/>
+        <p:nvPr/>
+      </p:nvGrpSpPr>
+      <p:grpSpPr>
+        <a:xfrm>
+          <a:off x="0" y="0"/>
+          <a:ext cx="0" cy="0"/>
+          <a:chOff x="0" y="0"/>
+          <a:chExt cx="0" cy="0"/>
+        </a:xfrm>
+      </p:grpSpPr>
+      <p:sp>
+        <p:nvSpPr>
+          <p:cNvPr id="6146" name="Rectangle 2"/>
+          <p:cNvSpPr>
+            <a:spLocks noGrp="1" noChangeArrowheads="1"/>
+          </p:cNvSpPr>
+          <p:nvPr>
+            <p:ph type="title"/>
+            <p:custDataLst>
+              <p:tags r:id="rId1"/>
+            </p:custDataLst>
+          </p:nvPr>
+        </p:nvSpPr>
+        <p:spPr/>
+        <p:txBody>
+          <a:bodyPr/>
+          <a:lstStyle/>
+          <a:p>
+            <a:pPr algn="ctr"/>
+            <a:r>
+              <a:rPr lang="en-US" dirty="0"/>
+              <a:t>Monday, February 3</a:t>
+            </a:r>
+          </a:p>
+        </p:txBody>
+      </p:sp>
+      <p:sp>
+        <p:nvSpPr>
+          <p:cNvPr id="6147" name="Rectangle 3"/>
+          <p:cNvSpPr>
+            <a:spLocks noGrp="1" noChangeArrowheads="1"/>
+          </p:cNvSpPr>
+          <p:nvPr>
+            <p:ph sz="quarter" idx="1"/>
+            <p:custDataLst>
+              <p:tags r:id="rId2"/>
+            </p:custDataLst>
+          </p:nvPr>
+        </p:nvSpPr>
+        <p:spPr>
+          <a:xfrm>
+            <a:off x="381000" y="1371600"/>
+            <a:ext cx="8255000" cy="4800600"/>
+          </a:xfrm>
+        </p:spPr>
+        <p:txBody>
+          <a:bodyPr>
+            <a:normAutofit lnSpcReduction="10000"/>
+          </a:bodyPr>
+          <a:lstStyle/>
+          <a:p>
+            <a:r>
+              <a:rPr lang="en-US" dirty="0"/>
+              <a:t>First </a:t>
+            </a:r>
+            <a:r>
+              <a:rPr lang="en-US" b="1" i="1" dirty="0"/>
+              <a:t>Quizzes</a:t>
+            </a:r>
+            <a:r>
+              <a:rPr lang="en-US" dirty="0"/>
+              <a:t> have been graded!</a:t>
+            </a:r>
+          </a:p>
+          <a:p>
+            <a:pPr lvl="1"/>
+            <a:r>
+              <a:rPr lang="en-US" dirty="0"/>
+              <a:t>The grading was pretty strict by design. </a:t>
+            </a:r>
+          </a:p>
+          <a:p>
+            <a:r>
+              <a:rPr lang="en-US" b="1" i="1" dirty="0" err="1"/>
+              <a:t>Gradescope</a:t>
+            </a:r>
+            <a:r>
+              <a:rPr lang="en-US" dirty="0"/>
+              <a:t> appears to be working well so far</a:t>
+            </a:r>
+          </a:p>
+          <a:p>
+            <a:pPr lvl="1"/>
+            <a:r>
+              <a:rPr lang="en-US" dirty="0"/>
+              <a:t>Note that some problems may contain duplicate items given as input (e.g., edge 5,6 might be in list of edges twice)</a:t>
+            </a:r>
+          </a:p>
+          <a:p>
+            <a:r>
+              <a:rPr lang="en-US" b="1" i="1" dirty="0"/>
+              <a:t>Schedule</a:t>
+            </a:r>
+            <a:r>
+              <a:rPr lang="en-US" dirty="0"/>
+              <a:t> has changed (quizzes moved to Wednesdays)</a:t>
+            </a:r>
+          </a:p>
+          <a:p>
+            <a:r>
+              <a:rPr lang="en-US" dirty="0"/>
+              <a:t>Remember there is a </a:t>
+            </a:r>
+            <a:r>
+              <a:rPr lang="en-US" b="1" i="1" dirty="0"/>
+              <a:t>no laptop policy</a:t>
+            </a:r>
+          </a:p>
+          <a:p>
+            <a:pPr lvl="1"/>
+            <a:r>
+              <a:rPr lang="en-US" dirty="0"/>
+              <a:t>This was very frustrating on Friday. If you need to do work then go do work somewhere else.</a:t>
+            </a:r>
+          </a:p>
+          <a:p>
+            <a:r>
+              <a:rPr lang="en-US" dirty="0"/>
+              <a:t>Please join the class </a:t>
+            </a:r>
+            <a:r>
+              <a:rPr lang="en-US" b="1" i="1" dirty="0"/>
+              <a:t>Piazza</a:t>
+            </a:r>
+            <a:r>
+              <a:rPr lang="en-US" dirty="0"/>
+              <a:t> asap. </a:t>
+            </a:r>
+            <a:r>
+              <a:rPr lang="en-US" dirty="0" err="1"/>
+              <a:t>Tas</a:t>
+            </a:r>
+            <a:r>
+              <a:rPr lang="en-US" dirty="0"/>
+              <a:t> are posting common questions there.</a:t>
+            </a:r>
+          </a:p>
+          <a:p>
+            <a:r>
+              <a:rPr lang="en-US" dirty="0"/>
+              <a:t>Today we will begin </a:t>
+            </a:r>
+            <a:r>
+              <a:rPr lang="en-US" b="1" i="1" dirty="0"/>
+              <a:t>MST / find-union</a:t>
+            </a:r>
+          </a:p>
+        </p:txBody>
+      </p:sp>
+      <p:sp>
+        <p:nvSpPr>
+          <p:cNvPr id="4" name="Slide Number Placeholder 3"/>
+          <p:cNvSpPr>
+            <a:spLocks noGrp="1"/>
+          </p:cNvSpPr>
+          <p:nvPr>
+            <p:ph type="sldNum" sz="quarter" idx="12"/>
+          </p:nvPr>
+        </p:nvSpPr>
+        <p:spPr/>
+        <p:txBody>
+          <a:bodyPr/>
+          <a:lstStyle/>
+          <a:p>
+            <a:fld id="{F26D9103-0C5C-48AC-B68E-3ED2C1647047}" type="slidenum">
+              <a:rPr lang="en-US" smtClean="0"/>
+              <a:pPr/>
+              <a:t>9</a:t>
+            </a:fld>
+            <a:endParaRPr lang="en-US" dirty="0"/>
+          </a:p>
+        </p:txBody>
+      </p:sp>
+    </p:spTree>
+    <p:extLst>
+      <p:ext uri="{BB962C8B-B14F-4D97-AF65-F5344CB8AC3E}">
+        <p14:creationId xmlns:p14="http://schemas.microsoft.com/office/powerpoint/2010/main" val="2087915904"/>
+      </p:ext>
+    </p:extLst>
+  </p:cSld>
+  <p:clrMapOvr>
+    <a:masterClrMapping/>
+  </p:clrMapOvr>
+</p:sld>
+</file>
+
 <file path=ppt/tags/tag1.xml><?xml version="1.0" encoding="utf-8"?>
 <p:tagLst xmlns:a="http://schemas.openxmlformats.org/drawingml/2006/main" xmlns:r="http://schemas.openxmlformats.org/officeDocument/2006/relationships" xmlns:p="http://schemas.openxmlformats.org/presentationml/2006/main">
   <p:tag name="_INSTRUCTOR VIEW19C14C36-AC8E-43BC-9DB6-C2AAF774C7DC|PANE__TAG" val="_"/>
@@ -5849,6 +6244,30 @@
 </file>
 
 <file path=ppt/tags/tag13.xml><?xml version="1.0" encoding="utf-8"?>
+<p:tagLst xmlns:a="http://schemas.openxmlformats.org/drawingml/2006/main" xmlns:r="http://schemas.openxmlformats.org/officeDocument/2006/relationships" xmlns:p="http://schemas.openxmlformats.org/presentationml/2006/main">
+  <p:tag name="_INSTRUCTOR VIEW19C14C36-AC8E-43BC-9DB6-C2AAF774C7DC|PANE__TAG" val="_"/>
+</p:tagLst>
+</file>
+
+<file path=ppt/tags/tag14.xml><?xml version="1.0" encoding="utf-8"?>
+<p:tagLst xmlns:a="http://schemas.openxmlformats.org/drawingml/2006/main" xmlns:r="http://schemas.openxmlformats.org/officeDocument/2006/relationships" xmlns:p="http://schemas.openxmlformats.org/presentationml/2006/main">
+  <p:tag name="_INSTRUCTOR VIEW19C14C36-AC8E-43BC-9DB6-C2AAF774C7DC|PANE__TAG" val="_"/>
+</p:tagLst>
+</file>
+
+<file path=ppt/tags/tag15.xml><?xml version="1.0" encoding="utf-8"?>
+<p:tagLst xmlns:a="http://schemas.openxmlformats.org/drawingml/2006/main" xmlns:r="http://schemas.openxmlformats.org/officeDocument/2006/relationships" xmlns:p="http://schemas.openxmlformats.org/presentationml/2006/main">
+  <p:tag name="_INSTRUCTOR VIEW19C14C36-AC8E-43BC-9DB6-C2AAF774C7DC|PANE__TAG" val="_"/>
+</p:tagLst>
+</file>
+
+<file path=ppt/tags/tag16.xml><?xml version="1.0" encoding="utf-8"?>
+<p:tagLst xmlns:a="http://schemas.openxmlformats.org/drawingml/2006/main" xmlns:r="http://schemas.openxmlformats.org/officeDocument/2006/relationships" xmlns:p="http://schemas.openxmlformats.org/presentationml/2006/main">
+  <p:tag name="_INSTRUCTOR VIEW19C14C36-AC8E-43BC-9DB6-C2AAF774C7DC|PANE__TAG" val="_"/>
+</p:tagLst>
+</file>
+
+<file path=ppt/tags/tag17.xml><?xml version="1.0" encoding="utf-8"?>
 <p:tagLst xmlns:a="http://schemas.openxmlformats.org/drawingml/2006/main" xmlns:r="http://schemas.openxmlformats.org/officeDocument/2006/relationships" xmlns:p="http://schemas.openxmlformats.org/presentationml/2006/main">
   <p:tag name="_INSTRUCTOR VIEW19C14C36-AC8E-43BC-9DB6-C2AAF774C7DC|PANE__TAG" val="_"/>
 </p:tagLst>

</xml_diff>

<commit_message>
daily announcements, fix to quizzes
</commit_message>
<xml_diff>
--- a/slides/dailyAnnouncements.pptx
+++ b/slides/dailyAnnouncements.pptx
@@ -5,10 +5,10 @@
     <p:sldMasterId id="2147483728" r:id="rId1"/>
   </p:sldMasterIdLst>
   <p:notesMasterIdLst>
-    <p:notesMasterId r:id="rId11"/>
+    <p:notesMasterId r:id="rId12"/>
   </p:notesMasterIdLst>
   <p:handoutMasterIdLst>
-    <p:handoutMasterId r:id="rId12"/>
+    <p:handoutMasterId r:id="rId13"/>
   </p:handoutMasterIdLst>
   <p:sldIdLst>
     <p:sldId id="447" r:id="rId2"/>
@@ -20,11 +20,12 @@
     <p:sldId id="452" r:id="rId8"/>
     <p:sldId id="453" r:id="rId9"/>
     <p:sldId id="454" r:id="rId10"/>
+    <p:sldId id="455" r:id="rId11"/>
   </p:sldIdLst>
   <p:sldSz cx="9144000" cy="6858000" type="screen4x3"/>
   <p:notesSz cx="7315200" cy="9601200"/>
   <p:custDataLst>
-    <p:tags r:id="rId13"/>
+    <p:tags r:id="rId14"/>
   </p:custDataLst>
   <p:defaultTextStyle>
     <a:defPPr>
@@ -1024,7 +1025,7 @@
             <a:fld id="{E4886CB5-510A-4EF6-9466-BC7A8F0DDE87}" type="datetime1">
               <a:rPr lang="en-US" smtClean="0"/>
               <a:pPr/>
-              <a:t>2/3/20</a:t>
+              <a:t>2/5/20</a:t>
             </a:fld>
             <a:endParaRPr lang="en-US"/>
           </a:p>
@@ -1384,7 +1385,7 @@
             <a:fld id="{9B297853-24B4-4D05-83E4-0AD2E86C55E5}" type="datetime1">
               <a:rPr lang="en-US" smtClean="0"/>
               <a:pPr/>
-              <a:t>2/3/20</a:t>
+              <a:t>2/5/20</a:t>
             </a:fld>
             <a:endParaRPr lang="en-US"/>
           </a:p>
@@ -1560,7 +1561,7 @@
             <a:fld id="{01FCDD9E-5768-4705-9537-0C020B1BB310}" type="datetime1">
               <a:rPr lang="en-US" smtClean="0"/>
               <a:pPr/>
-              <a:t>2/3/20</a:t>
+              <a:t>2/5/20</a:t>
             </a:fld>
             <a:endParaRPr lang="en-US"/>
           </a:p>
@@ -1796,7 +1797,7 @@
             <a:fld id="{4257C27E-59C2-41CA-9776-94955CBEE440}" type="datetime1">
               <a:rPr lang="en-US" smtClean="0"/>
               <a:pPr/>
-              <a:t>2/3/20</a:t>
+              <a:t>2/5/20</a:t>
             </a:fld>
             <a:endParaRPr lang="en-US"/>
           </a:p>
@@ -2082,7 +2083,7 @@
             <a:fld id="{03180747-A137-49C6-9C74-AB7EE86F4904}" type="datetime1">
               <a:rPr lang="en-US" smtClean="0"/>
               <a:pPr/>
-              <a:t>2/3/20</a:t>
+              <a:t>2/5/20</a:t>
             </a:fld>
             <a:endParaRPr lang="en-US"/>
           </a:p>
@@ -2303,7 +2304,7 @@
             <a:fld id="{EBBA31D9-ADC1-480D-86A8-1EAFB6A86A35}" type="datetime1">
               <a:rPr lang="en-US" smtClean="0"/>
               <a:pPr/>
-              <a:t>2/3/20</a:t>
+              <a:t>2/5/20</a:t>
             </a:fld>
             <a:endParaRPr lang="en-US"/>
           </a:p>
@@ -2656,7 +2657,7 @@
             <a:fld id="{80AAE9AE-3B2F-4DEA-8C41-BDDF4CDF6F40}" type="datetime1">
               <a:rPr lang="en-US" smtClean="0"/>
               <a:pPr/>
-              <a:t>2/3/20</a:t>
+              <a:t>2/5/20</a:t>
             </a:fld>
             <a:endParaRPr lang="en-US"/>
           </a:p>
@@ -2889,7 +2890,7 @@
             <a:fld id="{48252F7F-E8FE-413B-8521-D4ED924C6DE5}" type="datetime1">
               <a:rPr lang="en-US" smtClean="0"/>
               <a:pPr/>
-              <a:t>2/3/20</a:t>
+              <a:t>2/5/20</a:t>
             </a:fld>
             <a:endParaRPr lang="en-US"/>
           </a:p>
@@ -3031,7 +3032,7 @@
             <a:fld id="{2FF1B124-70E3-4E4A-90E2-6B55DB7659B3}" type="datetime1">
               <a:rPr lang="en-US" smtClean="0"/>
               <a:pPr/>
-              <a:t>2/3/20</a:t>
+              <a:t>2/5/20</a:t>
             </a:fld>
             <a:endParaRPr lang="en-US"/>
           </a:p>
@@ -3309,7 +3310,7 @@
             <a:fld id="{4EBF4C98-3CD6-4C87-BD40-5718C2628835}" type="datetime1">
               <a:rPr lang="en-US" smtClean="0"/>
               <a:pPr/>
-              <a:t>2/3/20</a:t>
+              <a:t>2/5/20</a:t>
             </a:fld>
             <a:endParaRPr lang="en-US"/>
           </a:p>
@@ -3717,7 +3718,7 @@
             <a:fld id="{6D6408A8-6B1B-4CDA-875E-7BEECDBA31DF}" type="datetime1">
               <a:rPr lang="en-US" smtClean="0"/>
               <a:pPr/>
-              <a:t>2/3/20</a:t>
+              <a:t>2/5/20</a:t>
             </a:fld>
             <a:endParaRPr lang="en-US"/>
           </a:p>
@@ -4055,7 +4056,7 @@
             <a:fld id="{C55AAF07-D2F5-4B3C-B443-40DE8C337A77}" type="datetime1">
               <a:rPr lang="en-US" smtClean="0"/>
               <a:pPr/>
-              <a:t>2/3/20</a:t>
+              <a:t>2/5/20</a:t>
             </a:fld>
             <a:endParaRPr lang="en-US"/>
           </a:p>
@@ -4656,6 +4657,203 @@
 </p:sld>
 </file>
 
+<file path=ppt/slides/slide10.xml><?xml version="1.0" encoding="utf-8"?>
+<p:sld xmlns:a="http://schemas.openxmlformats.org/drawingml/2006/main" xmlns:r="http://schemas.openxmlformats.org/officeDocument/2006/relationships" xmlns:p="http://schemas.openxmlformats.org/presentationml/2006/main">
+  <p:cSld>
+    <p:spTree>
+      <p:nvGrpSpPr>
+        <p:cNvPr id="1" name=""/>
+        <p:cNvGrpSpPr/>
+        <p:nvPr/>
+      </p:nvGrpSpPr>
+      <p:grpSpPr>
+        <a:xfrm>
+          <a:off x="0" y="0"/>
+          <a:ext cx="0" cy="0"/>
+          <a:chOff x="0" y="0"/>
+          <a:chExt cx="0" cy="0"/>
+        </a:xfrm>
+      </p:grpSpPr>
+      <p:sp>
+        <p:nvSpPr>
+          <p:cNvPr id="6146" name="Rectangle 2"/>
+          <p:cNvSpPr>
+            <a:spLocks noGrp="1" noChangeArrowheads="1"/>
+          </p:cNvSpPr>
+          <p:nvPr>
+            <p:ph type="title"/>
+            <p:custDataLst>
+              <p:tags r:id="rId1"/>
+            </p:custDataLst>
+          </p:nvPr>
+        </p:nvSpPr>
+        <p:spPr/>
+        <p:txBody>
+          <a:bodyPr/>
+          <a:lstStyle/>
+          <a:p>
+            <a:pPr algn="ctr"/>
+            <a:r>
+              <a:rPr lang="en-US" dirty="0"/>
+              <a:t>Wednesday, February 5</a:t>
+            </a:r>
+          </a:p>
+        </p:txBody>
+      </p:sp>
+      <p:sp>
+        <p:nvSpPr>
+          <p:cNvPr id="6147" name="Rectangle 3"/>
+          <p:cNvSpPr>
+            <a:spLocks noGrp="1" noChangeArrowheads="1"/>
+          </p:cNvSpPr>
+          <p:nvPr>
+            <p:ph sz="quarter" idx="1"/>
+            <p:custDataLst>
+              <p:tags r:id="rId2"/>
+            </p:custDataLst>
+          </p:nvPr>
+        </p:nvSpPr>
+        <p:spPr>
+          <a:xfrm>
+            <a:off x="381000" y="1371600"/>
+            <a:ext cx="8255000" cy="4800600"/>
+          </a:xfrm>
+        </p:spPr>
+        <p:txBody>
+          <a:bodyPr>
+            <a:normAutofit/>
+          </a:bodyPr>
+          <a:lstStyle/>
+          <a:p>
+            <a:r>
+              <a:rPr lang="en-US" dirty="0"/>
+              <a:t>First </a:t>
+            </a:r>
+            <a:r>
+              <a:rPr lang="en-US" b="1" i="1" dirty="0"/>
+              <a:t>Quizzes</a:t>
+            </a:r>
+            <a:r>
+              <a:rPr lang="en-US" dirty="0"/>
+              <a:t> have been graded!</a:t>
+            </a:r>
+          </a:p>
+          <a:p>
+            <a:pPr lvl="1"/>
+            <a:r>
+              <a:rPr lang="en-US" dirty="0"/>
+              <a:t>The grading was pretty strict by design. </a:t>
+            </a:r>
+          </a:p>
+          <a:p>
+            <a:r>
+              <a:rPr lang="en-US" b="1" i="1" dirty="0" err="1"/>
+              <a:t>Gradescope</a:t>
+            </a:r>
+            <a:r>
+              <a:rPr lang="en-US" dirty="0"/>
+              <a:t> appears to be working well so far</a:t>
+            </a:r>
+          </a:p>
+          <a:p>
+            <a:pPr lvl="1"/>
+            <a:r>
+              <a:rPr lang="en-US" dirty="0"/>
+              <a:t>Note that some problems may contain duplicate items given as input (e.g., edge 5,6 might be in list of edges twice)</a:t>
+            </a:r>
+          </a:p>
+          <a:p>
+            <a:r>
+              <a:rPr lang="en-US" b="1" i="1" dirty="0"/>
+              <a:t>Schedule</a:t>
+            </a:r>
+            <a:r>
+              <a:rPr lang="en-US" dirty="0"/>
+              <a:t> has changed (quizzes moved to Wednesdays)</a:t>
+            </a:r>
+          </a:p>
+          <a:p>
+            <a:r>
+              <a:rPr lang="en-US" dirty="0"/>
+              <a:t>Remember there is a </a:t>
+            </a:r>
+            <a:r>
+              <a:rPr lang="en-US" b="1" i="1" dirty="0"/>
+              <a:t>no laptop policy</a:t>
+            </a:r>
+          </a:p>
+          <a:p>
+            <a:r>
+              <a:rPr lang="en-US" dirty="0"/>
+              <a:t>Please join the class </a:t>
+            </a:r>
+            <a:r>
+              <a:rPr lang="en-US" b="1" i="1" dirty="0"/>
+              <a:t>Piazza</a:t>
+            </a:r>
+            <a:r>
+              <a:rPr lang="en-US" dirty="0"/>
+              <a:t> asap. </a:t>
+            </a:r>
+            <a:r>
+              <a:rPr lang="en-US" dirty="0" err="1"/>
+              <a:t>Tas</a:t>
+            </a:r>
+            <a:r>
+              <a:rPr lang="en-US" dirty="0"/>
+              <a:t> are posting common questions there.</a:t>
+            </a:r>
+          </a:p>
+          <a:p>
+            <a:r>
+              <a:rPr lang="en-US" dirty="0"/>
+              <a:t>Today we will begin </a:t>
+            </a:r>
+            <a:r>
+              <a:rPr lang="en-US" b="1" i="1"/>
+              <a:t>Kruskal’s Algorithm</a:t>
+            </a:r>
+            <a:endParaRPr lang="en-US" b="1" i="1" dirty="0"/>
+          </a:p>
+        </p:txBody>
+      </p:sp>
+      <p:sp>
+        <p:nvSpPr>
+          <p:cNvPr id="4" name="Slide Number Placeholder 3"/>
+          <p:cNvSpPr>
+            <a:spLocks noGrp="1"/>
+          </p:cNvSpPr>
+          <p:nvPr>
+            <p:ph type="sldNum" sz="quarter" idx="12"/>
+          </p:nvPr>
+        </p:nvSpPr>
+        <p:spPr/>
+        <p:txBody>
+          <a:bodyPr/>
+          <a:lstStyle/>
+          <a:p>
+            <a:fld id="{F26D9103-0C5C-48AC-B68E-3ED2C1647047}" type="slidenum">
+              <a:rPr lang="en-US" smtClean="0"/>
+              <a:pPr/>
+              <a:t>10</a:t>
+            </a:fld>
+            <a:endParaRPr lang="en-US" dirty="0"/>
+          </a:p>
+        </p:txBody>
+      </p:sp>
+    </p:spTree>
+    <p:extLst>
+      <p:ext uri="{BB962C8B-B14F-4D97-AF65-F5344CB8AC3E}">
+        <p14:creationId xmlns:p14="http://schemas.microsoft.com/office/powerpoint/2010/main" val="2370622333"/>
+      </p:ext>
+    </p:extLst>
+  </p:cSld>
+  <p:clrMapOvr>
+    <a:masterClrMapping/>
+  </p:clrMapOvr>
+</p:sld>
+</file>
+
 <file path=ppt/slides/slide2.xml><?xml version="1.0" encoding="utf-8"?>
 <p:sld xmlns:a="http://schemas.openxmlformats.org/drawingml/2006/main" xmlns:r="http://schemas.openxmlformats.org/officeDocument/2006/relationships" xmlns:p="http://schemas.openxmlformats.org/presentationml/2006/main">
   <p:cSld>
@@ -6268,6 +6466,18 @@
 </file>
 
 <file path=ppt/tags/tag17.xml><?xml version="1.0" encoding="utf-8"?>
+<p:tagLst xmlns:a="http://schemas.openxmlformats.org/drawingml/2006/main" xmlns:r="http://schemas.openxmlformats.org/officeDocument/2006/relationships" xmlns:p="http://schemas.openxmlformats.org/presentationml/2006/main">
+  <p:tag name="_INSTRUCTOR VIEW19C14C36-AC8E-43BC-9DB6-C2AAF774C7DC|PANE__TAG" val="_"/>
+</p:tagLst>
+</file>
+
+<file path=ppt/tags/tag18.xml><?xml version="1.0" encoding="utf-8"?>
+<p:tagLst xmlns:a="http://schemas.openxmlformats.org/drawingml/2006/main" xmlns:r="http://schemas.openxmlformats.org/officeDocument/2006/relationships" xmlns:p="http://schemas.openxmlformats.org/presentationml/2006/main">
+  <p:tag name="_INSTRUCTOR VIEW19C14C36-AC8E-43BC-9DB6-C2AAF774C7DC|PANE__TAG" val="_"/>
+</p:tagLst>
+</file>
+
+<file path=ppt/tags/tag19.xml><?xml version="1.0" encoding="utf-8"?>
 <p:tagLst xmlns:a="http://schemas.openxmlformats.org/drawingml/2006/main" xmlns:r="http://schemas.openxmlformats.org/officeDocument/2006/relationships" xmlns:p="http://schemas.openxmlformats.org/presentationml/2006/main">
   <p:tag name="_INSTRUCTOR VIEW19C14C36-AC8E-43BC-9DB6-C2AAF774C7DC|PANE__TAG" val="_"/>
 </p:tagLst>

</xml_diff>

<commit_message>
announcements and small logistic chagnes
</commit_message>
<xml_diff>
--- a/slides/dailyAnnouncements.pptx
+++ b/slides/dailyAnnouncements.pptx
@@ -5,10 +5,10 @@
     <p:sldMasterId id="2147483728" r:id="rId1"/>
   </p:sldMasterIdLst>
   <p:notesMasterIdLst>
-    <p:notesMasterId r:id="rId13"/>
+    <p:notesMasterId r:id="rId14"/>
   </p:notesMasterIdLst>
   <p:handoutMasterIdLst>
-    <p:handoutMasterId r:id="rId14"/>
+    <p:handoutMasterId r:id="rId15"/>
   </p:handoutMasterIdLst>
   <p:sldIdLst>
     <p:sldId id="447" r:id="rId2"/>
@@ -22,11 +22,12 @@
     <p:sldId id="454" r:id="rId10"/>
     <p:sldId id="455" r:id="rId11"/>
     <p:sldId id="456" r:id="rId12"/>
+    <p:sldId id="457" r:id="rId13"/>
   </p:sldIdLst>
   <p:sldSz cx="9144000" cy="6858000" type="screen4x3"/>
   <p:notesSz cx="7315200" cy="9601200"/>
   <p:custDataLst>
-    <p:tags r:id="rId15"/>
+    <p:tags r:id="rId16"/>
   </p:custDataLst>
   <p:defaultTextStyle>
     <a:defPPr>
@@ -1026,7 +1027,7 @@
             <a:fld id="{E4886CB5-510A-4EF6-9466-BC7A8F0DDE87}" type="datetime1">
               <a:rPr lang="en-US" smtClean="0"/>
               <a:pPr/>
-              <a:t>2/7/20</a:t>
+              <a:t>2/10/20</a:t>
             </a:fld>
             <a:endParaRPr lang="en-US"/>
           </a:p>
@@ -1386,7 +1387,7 @@
             <a:fld id="{9B297853-24B4-4D05-83E4-0AD2E86C55E5}" type="datetime1">
               <a:rPr lang="en-US" smtClean="0"/>
               <a:pPr/>
-              <a:t>2/7/20</a:t>
+              <a:t>2/10/20</a:t>
             </a:fld>
             <a:endParaRPr lang="en-US"/>
           </a:p>
@@ -1562,7 +1563,7 @@
             <a:fld id="{01FCDD9E-5768-4705-9537-0C020B1BB310}" type="datetime1">
               <a:rPr lang="en-US" smtClean="0"/>
               <a:pPr/>
-              <a:t>2/7/20</a:t>
+              <a:t>2/10/20</a:t>
             </a:fld>
             <a:endParaRPr lang="en-US"/>
           </a:p>
@@ -1798,7 +1799,7 @@
             <a:fld id="{4257C27E-59C2-41CA-9776-94955CBEE440}" type="datetime1">
               <a:rPr lang="en-US" smtClean="0"/>
               <a:pPr/>
-              <a:t>2/7/20</a:t>
+              <a:t>2/10/20</a:t>
             </a:fld>
             <a:endParaRPr lang="en-US"/>
           </a:p>
@@ -2084,7 +2085,7 @@
             <a:fld id="{03180747-A137-49C6-9C74-AB7EE86F4904}" type="datetime1">
               <a:rPr lang="en-US" smtClean="0"/>
               <a:pPr/>
-              <a:t>2/7/20</a:t>
+              <a:t>2/10/20</a:t>
             </a:fld>
             <a:endParaRPr lang="en-US"/>
           </a:p>
@@ -2305,7 +2306,7 @@
             <a:fld id="{EBBA31D9-ADC1-480D-86A8-1EAFB6A86A35}" type="datetime1">
               <a:rPr lang="en-US" smtClean="0"/>
               <a:pPr/>
-              <a:t>2/7/20</a:t>
+              <a:t>2/10/20</a:t>
             </a:fld>
             <a:endParaRPr lang="en-US"/>
           </a:p>
@@ -2658,7 +2659,7 @@
             <a:fld id="{80AAE9AE-3B2F-4DEA-8C41-BDDF4CDF6F40}" type="datetime1">
               <a:rPr lang="en-US" smtClean="0"/>
               <a:pPr/>
-              <a:t>2/7/20</a:t>
+              <a:t>2/10/20</a:t>
             </a:fld>
             <a:endParaRPr lang="en-US"/>
           </a:p>
@@ -2891,7 +2892,7 @@
             <a:fld id="{48252F7F-E8FE-413B-8521-D4ED924C6DE5}" type="datetime1">
               <a:rPr lang="en-US" smtClean="0"/>
               <a:pPr/>
-              <a:t>2/7/20</a:t>
+              <a:t>2/10/20</a:t>
             </a:fld>
             <a:endParaRPr lang="en-US"/>
           </a:p>
@@ -3033,7 +3034,7 @@
             <a:fld id="{2FF1B124-70E3-4E4A-90E2-6B55DB7659B3}" type="datetime1">
               <a:rPr lang="en-US" smtClean="0"/>
               <a:pPr/>
-              <a:t>2/7/20</a:t>
+              <a:t>2/10/20</a:t>
             </a:fld>
             <a:endParaRPr lang="en-US"/>
           </a:p>
@@ -3311,7 +3312,7 @@
             <a:fld id="{4EBF4C98-3CD6-4C87-BD40-5718C2628835}" type="datetime1">
               <a:rPr lang="en-US" smtClean="0"/>
               <a:pPr/>
-              <a:t>2/7/20</a:t>
+              <a:t>2/10/20</a:t>
             </a:fld>
             <a:endParaRPr lang="en-US"/>
           </a:p>
@@ -3719,7 +3720,7 @@
             <a:fld id="{6D6408A8-6B1B-4CDA-875E-7BEECDBA31DF}" type="datetime1">
               <a:rPr lang="en-US" smtClean="0"/>
               <a:pPr/>
-              <a:t>2/7/20</a:t>
+              <a:t>2/10/20</a:t>
             </a:fld>
             <a:endParaRPr lang="en-US"/>
           </a:p>
@@ -4057,7 +4058,7 @@
             <a:fld id="{C55AAF07-D2F5-4B3C-B443-40DE8C337A77}" type="datetime1">
               <a:rPr lang="en-US" smtClean="0"/>
               <a:pPr/>
-              <a:t>2/7/20</a:t>
+              <a:t>2/10/20</a:t>
             </a:fld>
             <a:endParaRPr lang="en-US"/>
           </a:p>
@@ -5070,6 +5071,225 @@
 </p:sld>
 </file>
 
+<file path=ppt/slides/slide12.xml><?xml version="1.0" encoding="utf-8"?>
+<p:sld xmlns:a="http://schemas.openxmlformats.org/drawingml/2006/main" xmlns:r="http://schemas.openxmlformats.org/officeDocument/2006/relationships" xmlns:p="http://schemas.openxmlformats.org/presentationml/2006/main">
+  <p:cSld>
+    <p:spTree>
+      <p:nvGrpSpPr>
+        <p:cNvPr id="1" name=""/>
+        <p:cNvGrpSpPr/>
+        <p:nvPr/>
+      </p:nvGrpSpPr>
+      <p:grpSpPr>
+        <a:xfrm>
+          <a:off x="0" y="0"/>
+          <a:ext cx="0" cy="0"/>
+          <a:chOff x="0" y="0"/>
+          <a:chExt cx="0" cy="0"/>
+        </a:xfrm>
+      </p:grpSpPr>
+      <p:sp>
+        <p:nvSpPr>
+          <p:cNvPr id="6146" name="Rectangle 2"/>
+          <p:cNvSpPr>
+            <a:spLocks noGrp="1" noChangeArrowheads="1"/>
+          </p:cNvSpPr>
+          <p:nvPr>
+            <p:ph type="title"/>
+            <p:custDataLst>
+              <p:tags r:id="rId1"/>
+            </p:custDataLst>
+          </p:nvPr>
+        </p:nvSpPr>
+        <p:spPr/>
+        <p:txBody>
+          <a:bodyPr/>
+          <a:lstStyle/>
+          <a:p>
+            <a:pPr algn="ctr"/>
+            <a:r>
+              <a:rPr lang="en-US" dirty="0"/>
+              <a:t>Monday, February 10</a:t>
+            </a:r>
+          </a:p>
+        </p:txBody>
+      </p:sp>
+      <p:sp>
+        <p:nvSpPr>
+          <p:cNvPr id="6147" name="Rectangle 3"/>
+          <p:cNvSpPr>
+            <a:spLocks noGrp="1" noChangeArrowheads="1"/>
+          </p:cNvSpPr>
+          <p:nvPr>
+            <p:ph sz="quarter" idx="1"/>
+            <p:custDataLst>
+              <p:tags r:id="rId2"/>
+            </p:custDataLst>
+          </p:nvPr>
+        </p:nvSpPr>
+        <p:spPr>
+          <a:xfrm>
+            <a:off x="381000" y="1371600"/>
+            <a:ext cx="8255000" cy="4800600"/>
+          </a:xfrm>
+        </p:spPr>
+        <p:txBody>
+          <a:bodyPr>
+            <a:normAutofit lnSpcReduction="10000"/>
+          </a:bodyPr>
+          <a:lstStyle/>
+          <a:p>
+            <a:r>
+              <a:rPr lang="en-US" dirty="0"/>
+              <a:t>Quizzes update!</a:t>
+            </a:r>
+          </a:p>
+          <a:p>
+            <a:pPr lvl="1"/>
+            <a:r>
+              <a:rPr lang="en-US" dirty="0"/>
+              <a:t>You can officially do 3 per session (if you are able to fit it)</a:t>
+            </a:r>
+          </a:p>
+          <a:p>
+            <a:r>
+              <a:rPr lang="en-US" b="1" i="1" dirty="0" err="1"/>
+              <a:t>Gradescope</a:t>
+            </a:r>
+            <a:r>
+              <a:rPr lang="en-US" dirty="0"/>
+              <a:t> appears to be working well so far</a:t>
+            </a:r>
+          </a:p>
+          <a:p>
+            <a:pPr lvl="1"/>
+            <a:r>
+              <a:rPr lang="en-US" dirty="0"/>
+              <a:t>Make sure you use Java 8, that is the version on </a:t>
+            </a:r>
+            <a:r>
+              <a:rPr lang="en-US" dirty="0" err="1"/>
+              <a:t>gradescope</a:t>
+            </a:r>
+            <a:endParaRPr lang="en-US" dirty="0"/>
+          </a:p>
+          <a:p>
+            <a:pPr lvl="1"/>
+            <a:r>
+              <a:rPr lang="en-US" dirty="0"/>
+              <a:t>Python is version 3.6</a:t>
+            </a:r>
+          </a:p>
+          <a:p>
+            <a:pPr lvl="1"/>
+            <a:r>
+              <a:rPr lang="en-US" dirty="0"/>
+              <a:t>C++ you can add C++11 flag to </a:t>
+            </a:r>
+            <a:r>
+              <a:rPr lang="en-US" dirty="0" err="1"/>
+              <a:t>makefile</a:t>
+            </a:r>
+            <a:r>
+              <a:rPr lang="en-US" dirty="0"/>
+              <a:t>.</a:t>
+            </a:r>
+          </a:p>
+          <a:p>
+            <a:r>
+              <a:rPr lang="en-US" b="1" i="1" dirty="0"/>
+              <a:t>Next quiz </a:t>
+            </a:r>
+            <a:r>
+              <a:rPr lang="en-US" dirty="0"/>
+              <a:t>is THIS Wednesday.</a:t>
+            </a:r>
+          </a:p>
+          <a:p>
+            <a:r>
+              <a:rPr lang="en-US" dirty="0"/>
+              <a:t>Remember there is a </a:t>
+            </a:r>
+            <a:r>
+              <a:rPr lang="en-US" b="1" i="1" dirty="0"/>
+              <a:t>no laptop policy</a:t>
+            </a:r>
+          </a:p>
+          <a:p>
+            <a:r>
+              <a:rPr lang="en-US" dirty="0"/>
+              <a:t>Please join the class </a:t>
+            </a:r>
+            <a:r>
+              <a:rPr lang="en-US" b="1" i="1" dirty="0"/>
+              <a:t>Piazza</a:t>
+            </a:r>
+            <a:r>
+              <a:rPr lang="en-US" dirty="0"/>
+              <a:t> asap. </a:t>
+            </a:r>
+            <a:r>
+              <a:rPr lang="en-US" dirty="0" err="1"/>
+              <a:t>Tas</a:t>
+            </a:r>
+            <a:r>
+              <a:rPr lang="en-US" dirty="0"/>
+              <a:t> are posting common questions there.</a:t>
+            </a:r>
+          </a:p>
+          <a:p>
+            <a:r>
+              <a:rPr lang="en-US" dirty="0"/>
+              <a:t>Today we will </a:t>
+            </a:r>
+            <a:r>
+              <a:rPr lang="en-US"/>
+              <a:t>begin continue </a:t>
+            </a:r>
+            <a:r>
+              <a:rPr lang="en-US" b="1" i="1" dirty="0"/>
+              <a:t>Greedy Algorithms</a:t>
+            </a:r>
+          </a:p>
+        </p:txBody>
+      </p:sp>
+      <p:sp>
+        <p:nvSpPr>
+          <p:cNvPr id="4" name="Slide Number Placeholder 3"/>
+          <p:cNvSpPr>
+            <a:spLocks noGrp="1"/>
+          </p:cNvSpPr>
+          <p:nvPr>
+            <p:ph type="sldNum" sz="quarter" idx="12"/>
+          </p:nvPr>
+        </p:nvSpPr>
+        <p:spPr/>
+        <p:txBody>
+          <a:bodyPr/>
+          <a:lstStyle/>
+          <a:p>
+            <a:fld id="{F26D9103-0C5C-48AC-B68E-3ED2C1647047}" type="slidenum">
+              <a:rPr lang="en-US" smtClean="0"/>
+              <a:pPr/>
+              <a:t>12</a:t>
+            </a:fld>
+            <a:endParaRPr lang="en-US" dirty="0"/>
+          </a:p>
+        </p:txBody>
+      </p:sp>
+    </p:spTree>
+    <p:extLst>
+      <p:ext uri="{BB962C8B-B14F-4D97-AF65-F5344CB8AC3E}">
+        <p14:creationId xmlns:p14="http://schemas.microsoft.com/office/powerpoint/2010/main" val="2763402"/>
+      </p:ext>
+    </p:extLst>
+  </p:cSld>
+  <p:clrMapOvr>
+    <a:masterClrMapping/>
+  </p:clrMapOvr>
+</p:sld>
+</file>
+
 <file path=ppt/slides/slide2.xml><?xml version="1.0" encoding="utf-8"?>
 <p:sld xmlns:a="http://schemas.openxmlformats.org/drawingml/2006/main" xmlns:r="http://schemas.openxmlformats.org/officeDocument/2006/relationships" xmlns:p="http://schemas.openxmlformats.org/presentationml/2006/main">
   <p:cSld>
@@ -6712,6 +6932,18 @@
 </file>
 
 <file path=ppt/tags/tag21.xml><?xml version="1.0" encoding="utf-8"?>
+<p:tagLst xmlns:a="http://schemas.openxmlformats.org/drawingml/2006/main" xmlns:r="http://schemas.openxmlformats.org/officeDocument/2006/relationships" xmlns:p="http://schemas.openxmlformats.org/presentationml/2006/main">
+  <p:tag name="_INSTRUCTOR VIEW19C14C36-AC8E-43BC-9DB6-C2AAF774C7DC|PANE__TAG" val="_"/>
+</p:tagLst>
+</file>
+
+<file path=ppt/tags/tag22.xml><?xml version="1.0" encoding="utf-8"?>
+<p:tagLst xmlns:a="http://schemas.openxmlformats.org/drawingml/2006/main" xmlns:r="http://schemas.openxmlformats.org/officeDocument/2006/relationships" xmlns:p="http://schemas.openxmlformats.org/presentationml/2006/main">
+  <p:tag name="_INSTRUCTOR VIEW19C14C36-AC8E-43BC-9DB6-C2AAF774C7DC|PANE__TAG" val="_"/>
+</p:tagLst>
+</file>
+
+<file path=ppt/tags/tag23.xml><?xml version="1.0" encoding="utf-8"?>
 <p:tagLst xmlns:a="http://schemas.openxmlformats.org/drawingml/2006/main" xmlns:r="http://schemas.openxmlformats.org/officeDocument/2006/relationships" xmlns:p="http://schemas.openxmlformats.org/presentationml/2006/main">
   <p:tag name="_INSTRUCTOR VIEW19C14C36-AC8E-43BC-9DB6-C2AAF774C7DC|PANE__TAG" val="_"/>
 </p:tagLst>

</xml_diff>

<commit_message>
quiz updates and announcements
</commit_message>
<xml_diff>
--- a/slides/dailyAnnouncements.pptx
+++ b/slides/dailyAnnouncements.pptx
@@ -5,10 +5,10 @@
     <p:sldMasterId id="2147483728" r:id="rId1"/>
   </p:sldMasterIdLst>
   <p:notesMasterIdLst>
-    <p:notesMasterId r:id="rId14"/>
+    <p:notesMasterId r:id="rId15"/>
   </p:notesMasterIdLst>
   <p:handoutMasterIdLst>
-    <p:handoutMasterId r:id="rId15"/>
+    <p:handoutMasterId r:id="rId16"/>
   </p:handoutMasterIdLst>
   <p:sldIdLst>
     <p:sldId id="447" r:id="rId2"/>
@@ -23,11 +23,12 @@
     <p:sldId id="455" r:id="rId11"/>
     <p:sldId id="456" r:id="rId12"/>
     <p:sldId id="457" r:id="rId13"/>
+    <p:sldId id="458" r:id="rId14"/>
   </p:sldIdLst>
   <p:sldSz cx="9144000" cy="6858000" type="screen4x3"/>
   <p:notesSz cx="7315200" cy="9601200"/>
   <p:custDataLst>
-    <p:tags r:id="rId16"/>
+    <p:tags r:id="rId17"/>
   </p:custDataLst>
   <p:defaultTextStyle>
     <a:defPPr>
@@ -1027,7 +1028,7 @@
             <a:fld id="{E4886CB5-510A-4EF6-9466-BC7A8F0DDE87}" type="datetime1">
               <a:rPr lang="en-US" smtClean="0"/>
               <a:pPr/>
-              <a:t>2/10/20</a:t>
+              <a:t>2/14/20</a:t>
             </a:fld>
             <a:endParaRPr lang="en-US"/>
           </a:p>
@@ -1387,7 +1388,7 @@
             <a:fld id="{9B297853-24B4-4D05-83E4-0AD2E86C55E5}" type="datetime1">
               <a:rPr lang="en-US" smtClean="0"/>
               <a:pPr/>
-              <a:t>2/10/20</a:t>
+              <a:t>2/14/20</a:t>
             </a:fld>
             <a:endParaRPr lang="en-US"/>
           </a:p>
@@ -1563,7 +1564,7 @@
             <a:fld id="{01FCDD9E-5768-4705-9537-0C020B1BB310}" type="datetime1">
               <a:rPr lang="en-US" smtClean="0"/>
               <a:pPr/>
-              <a:t>2/10/20</a:t>
+              <a:t>2/14/20</a:t>
             </a:fld>
             <a:endParaRPr lang="en-US"/>
           </a:p>
@@ -1799,7 +1800,7 @@
             <a:fld id="{4257C27E-59C2-41CA-9776-94955CBEE440}" type="datetime1">
               <a:rPr lang="en-US" smtClean="0"/>
               <a:pPr/>
-              <a:t>2/10/20</a:t>
+              <a:t>2/14/20</a:t>
             </a:fld>
             <a:endParaRPr lang="en-US"/>
           </a:p>
@@ -2085,7 +2086,7 @@
             <a:fld id="{03180747-A137-49C6-9C74-AB7EE86F4904}" type="datetime1">
               <a:rPr lang="en-US" smtClean="0"/>
               <a:pPr/>
-              <a:t>2/10/20</a:t>
+              <a:t>2/14/20</a:t>
             </a:fld>
             <a:endParaRPr lang="en-US"/>
           </a:p>
@@ -2306,7 +2307,7 @@
             <a:fld id="{EBBA31D9-ADC1-480D-86A8-1EAFB6A86A35}" type="datetime1">
               <a:rPr lang="en-US" smtClean="0"/>
               <a:pPr/>
-              <a:t>2/10/20</a:t>
+              <a:t>2/14/20</a:t>
             </a:fld>
             <a:endParaRPr lang="en-US"/>
           </a:p>
@@ -2659,7 +2660,7 @@
             <a:fld id="{80AAE9AE-3B2F-4DEA-8C41-BDDF4CDF6F40}" type="datetime1">
               <a:rPr lang="en-US" smtClean="0"/>
               <a:pPr/>
-              <a:t>2/10/20</a:t>
+              <a:t>2/14/20</a:t>
             </a:fld>
             <a:endParaRPr lang="en-US"/>
           </a:p>
@@ -2892,7 +2893,7 @@
             <a:fld id="{48252F7F-E8FE-413B-8521-D4ED924C6DE5}" type="datetime1">
               <a:rPr lang="en-US" smtClean="0"/>
               <a:pPr/>
-              <a:t>2/10/20</a:t>
+              <a:t>2/14/20</a:t>
             </a:fld>
             <a:endParaRPr lang="en-US"/>
           </a:p>
@@ -3034,7 +3035,7 @@
             <a:fld id="{2FF1B124-70E3-4E4A-90E2-6B55DB7659B3}" type="datetime1">
               <a:rPr lang="en-US" smtClean="0"/>
               <a:pPr/>
-              <a:t>2/10/20</a:t>
+              <a:t>2/14/20</a:t>
             </a:fld>
             <a:endParaRPr lang="en-US"/>
           </a:p>
@@ -3312,7 +3313,7 @@
             <a:fld id="{4EBF4C98-3CD6-4C87-BD40-5718C2628835}" type="datetime1">
               <a:rPr lang="en-US" smtClean="0"/>
               <a:pPr/>
-              <a:t>2/10/20</a:t>
+              <a:t>2/14/20</a:t>
             </a:fld>
             <a:endParaRPr lang="en-US"/>
           </a:p>
@@ -3720,7 +3721,7 @@
             <a:fld id="{6D6408A8-6B1B-4CDA-875E-7BEECDBA31DF}" type="datetime1">
               <a:rPr lang="en-US" smtClean="0"/>
               <a:pPr/>
-              <a:t>2/10/20</a:t>
+              <a:t>2/14/20</a:t>
             </a:fld>
             <a:endParaRPr lang="en-US"/>
           </a:p>
@@ -4058,7 +4059,7 @@
             <a:fld id="{C55AAF07-D2F5-4B3C-B443-40DE8C337A77}" type="datetime1">
               <a:rPr lang="en-US" smtClean="0"/>
               <a:pPr/>
-              <a:t>2/10/20</a:t>
+              <a:t>2/14/20</a:t>
             </a:fld>
             <a:endParaRPr lang="en-US"/>
           </a:p>
@@ -5290,6 +5291,204 @@
 </p:sld>
 </file>
 
+<file path=ppt/slides/slide13.xml><?xml version="1.0" encoding="utf-8"?>
+<p:sld xmlns:a="http://schemas.openxmlformats.org/drawingml/2006/main" xmlns:r="http://schemas.openxmlformats.org/officeDocument/2006/relationships" xmlns:p="http://schemas.openxmlformats.org/presentationml/2006/main">
+  <p:cSld>
+    <p:spTree>
+      <p:nvGrpSpPr>
+        <p:cNvPr id="1" name=""/>
+        <p:cNvGrpSpPr/>
+        <p:nvPr/>
+      </p:nvGrpSpPr>
+      <p:grpSpPr>
+        <a:xfrm>
+          <a:off x="0" y="0"/>
+          <a:ext cx="0" cy="0"/>
+          <a:chOff x="0" y="0"/>
+          <a:chExt cx="0" cy="0"/>
+        </a:xfrm>
+      </p:grpSpPr>
+      <p:sp>
+        <p:nvSpPr>
+          <p:cNvPr id="6146" name="Rectangle 2"/>
+          <p:cNvSpPr>
+            <a:spLocks noGrp="1" noChangeArrowheads="1"/>
+          </p:cNvSpPr>
+          <p:nvPr>
+            <p:ph type="title"/>
+            <p:custDataLst>
+              <p:tags r:id="rId1"/>
+            </p:custDataLst>
+          </p:nvPr>
+        </p:nvSpPr>
+        <p:spPr/>
+        <p:txBody>
+          <a:bodyPr/>
+          <a:lstStyle/>
+          <a:p>
+            <a:pPr algn="ctr"/>
+            <a:r>
+              <a:rPr lang="en-US" dirty="0"/>
+              <a:t>Friday, February 14</a:t>
+            </a:r>
+          </a:p>
+        </p:txBody>
+      </p:sp>
+      <p:sp>
+        <p:nvSpPr>
+          <p:cNvPr id="6147" name="Rectangle 3"/>
+          <p:cNvSpPr>
+            <a:spLocks noGrp="1" noChangeArrowheads="1"/>
+          </p:cNvSpPr>
+          <p:nvPr>
+            <p:ph sz="quarter" idx="1"/>
+            <p:custDataLst>
+              <p:tags r:id="rId2"/>
+            </p:custDataLst>
+          </p:nvPr>
+        </p:nvSpPr>
+        <p:spPr>
+          <a:xfrm>
+            <a:off x="381000" y="1371600"/>
+            <a:ext cx="8255000" cy="4800600"/>
+          </a:xfrm>
+        </p:spPr>
+        <p:txBody>
+          <a:bodyPr>
+            <a:normAutofit lnSpcReduction="10000"/>
+          </a:bodyPr>
+          <a:lstStyle/>
+          <a:p>
+            <a:r>
+              <a:rPr lang="en-US" dirty="0"/>
+              <a:t>Happy Valentines Day?</a:t>
+            </a:r>
+          </a:p>
+          <a:p>
+            <a:r>
+              <a:rPr lang="en-US" dirty="0"/>
+              <a:t>Quizzes from Wed. will be graded by end of weekend.</a:t>
+            </a:r>
+          </a:p>
+          <a:p>
+            <a:r>
+              <a:rPr lang="en-US" b="1" i="1" dirty="0" err="1"/>
+              <a:t>Gradescope</a:t>
+            </a:r>
+            <a:r>
+              <a:rPr lang="en-US" dirty="0"/>
+              <a:t> appears to be working well so far</a:t>
+            </a:r>
+          </a:p>
+          <a:p>
+            <a:pPr lvl="1"/>
+            <a:r>
+              <a:rPr lang="en-US" dirty="0"/>
+              <a:t>I’m mad about the due date issue. Any thoughts??</a:t>
+            </a:r>
+          </a:p>
+          <a:p>
+            <a:r>
+              <a:rPr lang="en-US" dirty="0"/>
+              <a:t>Interested in a discussion section w/ grad ta?</a:t>
+            </a:r>
+          </a:p>
+          <a:p>
+            <a:pPr lvl="1"/>
+            <a:r>
+              <a:rPr lang="en-US" dirty="0"/>
+              <a:t>Could go over…solutions / advice for </a:t>
+            </a:r>
+            <a:r>
+              <a:rPr lang="en-US" dirty="0" err="1"/>
+              <a:t>hw</a:t>
+            </a:r>
+            <a:r>
+              <a:rPr lang="en-US" dirty="0"/>
+              <a:t> problems, proofs, etc.</a:t>
+            </a:r>
+          </a:p>
+          <a:p>
+            <a:r>
+              <a:rPr lang="en-US" dirty="0"/>
+              <a:t>Remember there is a </a:t>
+            </a:r>
+            <a:r>
+              <a:rPr lang="en-US" b="1" i="1" dirty="0"/>
+              <a:t>no laptop policy</a:t>
+            </a:r>
+          </a:p>
+          <a:p>
+            <a:r>
+              <a:rPr lang="en-US" dirty="0"/>
+              <a:t>Please join the class </a:t>
+            </a:r>
+            <a:r>
+              <a:rPr lang="en-US" b="1" i="1" dirty="0"/>
+              <a:t>Piazza</a:t>
+            </a:r>
+            <a:r>
+              <a:rPr lang="en-US" dirty="0"/>
+              <a:t> asap. </a:t>
+            </a:r>
+            <a:r>
+              <a:rPr lang="en-US" dirty="0" err="1"/>
+              <a:t>Tas</a:t>
+            </a:r>
+            <a:r>
+              <a:rPr lang="en-US" dirty="0"/>
+              <a:t> are posting common questions there.</a:t>
+            </a:r>
+          </a:p>
+          <a:p>
+            <a:r>
+              <a:rPr lang="en-US" dirty="0"/>
+              <a:t>Today we will begin continue </a:t>
+            </a:r>
+            <a:r>
+              <a:rPr lang="en-US" b="1" i="1" dirty="0"/>
+              <a:t>Greedy Algorithms</a:t>
+            </a:r>
+          </a:p>
+        </p:txBody>
+      </p:sp>
+      <p:sp>
+        <p:nvSpPr>
+          <p:cNvPr id="4" name="Slide Number Placeholder 3"/>
+          <p:cNvSpPr>
+            <a:spLocks noGrp="1"/>
+          </p:cNvSpPr>
+          <p:nvPr>
+            <p:ph type="sldNum" sz="quarter" idx="12"/>
+          </p:nvPr>
+        </p:nvSpPr>
+        <p:spPr/>
+        <p:txBody>
+          <a:bodyPr/>
+          <a:lstStyle/>
+          <a:p>
+            <a:fld id="{F26D9103-0C5C-48AC-B68E-3ED2C1647047}" type="slidenum">
+              <a:rPr lang="en-US" smtClean="0"/>
+              <a:pPr/>
+              <a:t>13</a:t>
+            </a:fld>
+            <a:endParaRPr lang="en-US" dirty="0"/>
+          </a:p>
+        </p:txBody>
+      </p:sp>
+    </p:spTree>
+    <p:extLst>
+      <p:ext uri="{BB962C8B-B14F-4D97-AF65-F5344CB8AC3E}">
+        <p14:creationId xmlns:p14="http://schemas.microsoft.com/office/powerpoint/2010/main" val="3414434045"/>
+      </p:ext>
+    </p:extLst>
+  </p:cSld>
+  <p:clrMapOvr>
+    <a:masterClrMapping/>
+  </p:clrMapOvr>
+</p:sld>
+</file>
+
 <file path=ppt/slides/slide2.xml><?xml version="1.0" encoding="utf-8"?>
 <p:sld xmlns:a="http://schemas.openxmlformats.org/drawingml/2006/main" xmlns:r="http://schemas.openxmlformats.org/officeDocument/2006/relationships" xmlns:p="http://schemas.openxmlformats.org/presentationml/2006/main">
   <p:cSld>
@@ -6944,6 +7143,18 @@
 </file>
 
 <file path=ppt/tags/tag23.xml><?xml version="1.0" encoding="utf-8"?>
+<p:tagLst xmlns:a="http://schemas.openxmlformats.org/drawingml/2006/main" xmlns:r="http://schemas.openxmlformats.org/officeDocument/2006/relationships" xmlns:p="http://schemas.openxmlformats.org/presentationml/2006/main">
+  <p:tag name="_INSTRUCTOR VIEW19C14C36-AC8E-43BC-9DB6-C2AAF774C7DC|PANE__TAG" val="_"/>
+</p:tagLst>
+</file>
+
+<file path=ppt/tags/tag24.xml><?xml version="1.0" encoding="utf-8"?>
+<p:tagLst xmlns:a="http://schemas.openxmlformats.org/drawingml/2006/main" xmlns:r="http://schemas.openxmlformats.org/officeDocument/2006/relationships" xmlns:p="http://schemas.openxmlformats.org/presentationml/2006/main">
+  <p:tag name="_INSTRUCTOR VIEW19C14C36-AC8E-43BC-9DB6-C2AAF774C7DC|PANE__TAG" val="_"/>
+</p:tagLst>
+</file>
+
+<file path=ppt/tags/tag25.xml><?xml version="1.0" encoding="utf-8"?>
 <p:tagLst xmlns:a="http://schemas.openxmlformats.org/drawingml/2006/main" xmlns:r="http://schemas.openxmlformats.org/officeDocument/2006/relationships" xmlns:p="http://schemas.openxmlformats.org/presentationml/2006/main">
   <p:tag name="_INSTRUCTOR VIEW19C14C36-AC8E-43BC-9DB6-C2AAF774C7DC|PANE__TAG" val="_"/>
 </p:tagLst>

</xml_diff>

<commit_message>
writing rest of the quizzes. Daily announcements updates
</commit_message>
<xml_diff>
--- a/slides/dailyAnnouncements.pptx
+++ b/slides/dailyAnnouncements.pptx
@@ -5,10 +5,10 @@
     <p:sldMasterId id="2147483728" r:id="rId1"/>
   </p:sldMasterIdLst>
   <p:notesMasterIdLst>
-    <p:notesMasterId r:id="rId18"/>
+    <p:notesMasterId r:id="rId19"/>
   </p:notesMasterIdLst>
   <p:handoutMasterIdLst>
-    <p:handoutMasterId r:id="rId19"/>
+    <p:handoutMasterId r:id="rId20"/>
   </p:handoutMasterIdLst>
   <p:sldIdLst>
     <p:sldId id="447" r:id="rId2"/>
@@ -27,11 +27,12 @@
     <p:sldId id="459" r:id="rId15"/>
     <p:sldId id="460" r:id="rId16"/>
     <p:sldId id="461" r:id="rId17"/>
+    <p:sldId id="462" r:id="rId18"/>
   </p:sldIdLst>
   <p:sldSz cx="9144000" cy="6858000" type="screen4x3"/>
   <p:notesSz cx="7315200" cy="9601200"/>
   <p:custDataLst>
-    <p:tags r:id="rId20"/>
+    <p:tags r:id="rId21"/>
   </p:custDataLst>
   <p:defaultTextStyle>
     <a:defPPr>
@@ -1031,7 +1032,7 @@
             <a:fld id="{E4886CB5-510A-4EF6-9466-BC7A8F0DDE87}" type="datetime1">
               <a:rPr lang="en-US" smtClean="0"/>
               <a:pPr/>
-              <a:t>2/24/20</a:t>
+              <a:t>2/28/20</a:t>
             </a:fld>
             <a:endParaRPr lang="en-US"/>
           </a:p>
@@ -1391,7 +1392,7 @@
             <a:fld id="{9B297853-24B4-4D05-83E4-0AD2E86C55E5}" type="datetime1">
               <a:rPr lang="en-US" smtClean="0"/>
               <a:pPr/>
-              <a:t>2/24/20</a:t>
+              <a:t>2/28/20</a:t>
             </a:fld>
             <a:endParaRPr lang="en-US"/>
           </a:p>
@@ -1567,7 +1568,7 @@
             <a:fld id="{01FCDD9E-5768-4705-9537-0C020B1BB310}" type="datetime1">
               <a:rPr lang="en-US" smtClean="0"/>
               <a:pPr/>
-              <a:t>2/24/20</a:t>
+              <a:t>2/28/20</a:t>
             </a:fld>
             <a:endParaRPr lang="en-US"/>
           </a:p>
@@ -1803,7 +1804,7 @@
             <a:fld id="{4257C27E-59C2-41CA-9776-94955CBEE440}" type="datetime1">
               <a:rPr lang="en-US" smtClean="0"/>
               <a:pPr/>
-              <a:t>2/24/20</a:t>
+              <a:t>2/28/20</a:t>
             </a:fld>
             <a:endParaRPr lang="en-US"/>
           </a:p>
@@ -2089,7 +2090,7 @@
             <a:fld id="{03180747-A137-49C6-9C74-AB7EE86F4904}" type="datetime1">
               <a:rPr lang="en-US" smtClean="0"/>
               <a:pPr/>
-              <a:t>2/24/20</a:t>
+              <a:t>2/28/20</a:t>
             </a:fld>
             <a:endParaRPr lang="en-US"/>
           </a:p>
@@ -2310,7 +2311,7 @@
             <a:fld id="{EBBA31D9-ADC1-480D-86A8-1EAFB6A86A35}" type="datetime1">
               <a:rPr lang="en-US" smtClean="0"/>
               <a:pPr/>
-              <a:t>2/24/20</a:t>
+              <a:t>2/28/20</a:t>
             </a:fld>
             <a:endParaRPr lang="en-US"/>
           </a:p>
@@ -2663,7 +2664,7 @@
             <a:fld id="{80AAE9AE-3B2F-4DEA-8C41-BDDF4CDF6F40}" type="datetime1">
               <a:rPr lang="en-US" smtClean="0"/>
               <a:pPr/>
-              <a:t>2/24/20</a:t>
+              <a:t>2/28/20</a:t>
             </a:fld>
             <a:endParaRPr lang="en-US"/>
           </a:p>
@@ -2896,7 +2897,7 @@
             <a:fld id="{48252F7F-E8FE-413B-8521-D4ED924C6DE5}" type="datetime1">
               <a:rPr lang="en-US" smtClean="0"/>
               <a:pPr/>
-              <a:t>2/24/20</a:t>
+              <a:t>2/28/20</a:t>
             </a:fld>
             <a:endParaRPr lang="en-US"/>
           </a:p>
@@ -3038,7 +3039,7 @@
             <a:fld id="{2FF1B124-70E3-4E4A-90E2-6B55DB7659B3}" type="datetime1">
               <a:rPr lang="en-US" smtClean="0"/>
               <a:pPr/>
-              <a:t>2/24/20</a:t>
+              <a:t>2/28/20</a:t>
             </a:fld>
             <a:endParaRPr lang="en-US"/>
           </a:p>
@@ -3316,7 +3317,7 @@
             <a:fld id="{4EBF4C98-3CD6-4C87-BD40-5718C2628835}" type="datetime1">
               <a:rPr lang="en-US" smtClean="0"/>
               <a:pPr/>
-              <a:t>2/24/20</a:t>
+              <a:t>2/28/20</a:t>
             </a:fld>
             <a:endParaRPr lang="en-US"/>
           </a:p>
@@ -3724,7 +3725,7 @@
             <a:fld id="{6D6408A8-6B1B-4CDA-875E-7BEECDBA31DF}" type="datetime1">
               <a:rPr lang="en-US" smtClean="0"/>
               <a:pPr/>
-              <a:t>2/24/20</a:t>
+              <a:t>2/28/20</a:t>
             </a:fld>
             <a:endParaRPr lang="en-US"/>
           </a:p>
@@ -4062,7 +4063,7 @@
             <a:fld id="{C55AAF07-D2F5-4B3C-B443-40DE8C337A77}" type="datetime1">
               <a:rPr lang="en-US" smtClean="0"/>
               <a:pPr/>
-              <a:t>2/24/20</a:t>
+              <a:t>2/28/20</a:t>
             </a:fld>
             <a:endParaRPr lang="en-US"/>
           </a:p>
@@ -6047,6 +6048,208 @@
 </p:sld>
 </file>
 
+<file path=ppt/slides/slide17.xml><?xml version="1.0" encoding="utf-8"?>
+<p:sld xmlns:a="http://schemas.openxmlformats.org/drawingml/2006/main" xmlns:r="http://schemas.openxmlformats.org/officeDocument/2006/relationships" xmlns:p="http://schemas.openxmlformats.org/presentationml/2006/main">
+  <p:cSld>
+    <p:spTree>
+      <p:nvGrpSpPr>
+        <p:cNvPr id="1" name=""/>
+        <p:cNvGrpSpPr/>
+        <p:nvPr/>
+      </p:nvGrpSpPr>
+      <p:grpSpPr>
+        <a:xfrm>
+          <a:off x="0" y="0"/>
+          <a:ext cx="0" cy="0"/>
+          <a:chOff x="0" y="0"/>
+          <a:chExt cx="0" cy="0"/>
+        </a:xfrm>
+      </p:grpSpPr>
+      <p:sp>
+        <p:nvSpPr>
+          <p:cNvPr id="6146" name="Rectangle 2"/>
+          <p:cNvSpPr>
+            <a:spLocks noGrp="1" noChangeArrowheads="1"/>
+          </p:cNvSpPr>
+          <p:nvPr>
+            <p:ph type="title"/>
+            <p:custDataLst>
+              <p:tags r:id="rId1"/>
+            </p:custDataLst>
+          </p:nvPr>
+        </p:nvSpPr>
+        <p:spPr/>
+        <p:txBody>
+          <a:bodyPr/>
+          <a:lstStyle/>
+          <a:p>
+            <a:pPr algn="ctr"/>
+            <a:r>
+              <a:rPr lang="en-US" dirty="0"/>
+              <a:t>Monday, February 24</a:t>
+            </a:r>
+          </a:p>
+        </p:txBody>
+      </p:sp>
+      <p:sp>
+        <p:nvSpPr>
+          <p:cNvPr id="6147" name="Rectangle 3"/>
+          <p:cNvSpPr>
+            <a:spLocks noGrp="1" noChangeArrowheads="1"/>
+          </p:cNvSpPr>
+          <p:nvPr>
+            <p:ph sz="quarter" idx="1"/>
+            <p:custDataLst>
+              <p:tags r:id="rId2"/>
+            </p:custDataLst>
+          </p:nvPr>
+        </p:nvSpPr>
+        <p:spPr>
+          <a:xfrm>
+            <a:off x="381000" y="1371600"/>
+            <a:ext cx="8255000" cy="5105400"/>
+          </a:xfrm>
+        </p:spPr>
+        <p:txBody>
+          <a:bodyPr>
+            <a:normAutofit lnSpcReduction="10000"/>
+          </a:bodyPr>
+          <a:lstStyle/>
+          <a:p>
+            <a:r>
+              <a:rPr lang="en-US" dirty="0"/>
+              <a:t>Every </a:t>
+            </a:r>
+            <a:r>
+              <a:rPr lang="en-US" b="1" i="1" dirty="0"/>
+              <a:t>assignment</a:t>
+            </a:r>
+            <a:r>
+              <a:rPr lang="en-US" dirty="0"/>
+              <a:t> is now written and on course website</a:t>
+            </a:r>
+          </a:p>
+          <a:p>
+            <a:pPr lvl="1"/>
+            <a:r>
+              <a:rPr lang="en-US" dirty="0"/>
+              <a:t>All are on </a:t>
+            </a:r>
+            <a:r>
+              <a:rPr lang="en-US" dirty="0" err="1"/>
+              <a:t>Gradescope</a:t>
+            </a:r>
+            <a:r>
+              <a:rPr lang="en-US" dirty="0"/>
+              <a:t> as well</a:t>
+            </a:r>
+          </a:p>
+          <a:p>
+            <a:r>
+              <a:rPr lang="en-US" dirty="0"/>
+              <a:t>All the </a:t>
+            </a:r>
+            <a:r>
+              <a:rPr lang="en-US" b="1" i="1" dirty="0"/>
+              <a:t>quizzes</a:t>
+            </a:r>
+            <a:r>
+              <a:rPr lang="en-US" dirty="0"/>
+              <a:t> are now written if you want to look ahead</a:t>
+            </a:r>
+          </a:p>
+          <a:p>
+            <a:r>
+              <a:rPr lang="en-US" dirty="0"/>
+              <a:t>First optional discussion section is today!</a:t>
+            </a:r>
+          </a:p>
+          <a:p>
+            <a:pPr lvl="1"/>
+            <a:r>
+              <a:rPr lang="en-US" dirty="0"/>
+              <a:t>4-6pm in Rice 504. That room is small so we will get bigger room if necessary for future.</a:t>
+            </a:r>
+          </a:p>
+          <a:p>
+            <a:r>
+              <a:rPr lang="en-US" dirty="0"/>
+              <a:t>Remember there is a </a:t>
+            </a:r>
+            <a:r>
+              <a:rPr lang="en-US" b="1" i="1" dirty="0"/>
+              <a:t>no laptop policy</a:t>
+            </a:r>
+          </a:p>
+          <a:p>
+            <a:r>
+              <a:rPr lang="en-US" dirty="0"/>
+              <a:t>If you are on pace, you should be done with:</a:t>
+            </a:r>
+          </a:p>
+          <a:p>
+            <a:pPr lvl="1"/>
+            <a:r>
+              <a:rPr lang="en-US" dirty="0"/>
+              <a:t>COMPLETED: Graphs – Basic, Find-Union, Graphs – Advanced</a:t>
+            </a:r>
+          </a:p>
+          <a:p>
+            <a:pPr lvl="1"/>
+            <a:r>
+              <a:rPr lang="en-US" dirty="0"/>
+              <a:t>Greedy-Basic recommended deadline is today.</a:t>
+            </a:r>
+          </a:p>
+          <a:p>
+            <a:r>
+              <a:rPr lang="en-US" dirty="0"/>
+              <a:t>Today we will continue </a:t>
+            </a:r>
+            <a:r>
+              <a:rPr lang="en-US" b="1" i="1" dirty="0"/>
+              <a:t>divide and conquer</a:t>
+            </a:r>
+          </a:p>
+        </p:txBody>
+      </p:sp>
+      <p:sp>
+        <p:nvSpPr>
+          <p:cNvPr id="4" name="Slide Number Placeholder 3"/>
+          <p:cNvSpPr>
+            <a:spLocks noGrp="1"/>
+          </p:cNvSpPr>
+          <p:nvPr>
+            <p:ph type="sldNum" sz="quarter" idx="12"/>
+          </p:nvPr>
+        </p:nvSpPr>
+        <p:spPr/>
+        <p:txBody>
+          <a:bodyPr/>
+          <a:lstStyle/>
+          <a:p>
+            <a:fld id="{F26D9103-0C5C-48AC-B68E-3ED2C1647047}" type="slidenum">
+              <a:rPr lang="en-US" smtClean="0"/>
+              <a:pPr/>
+              <a:t>17</a:t>
+            </a:fld>
+            <a:endParaRPr lang="en-US" dirty="0"/>
+          </a:p>
+        </p:txBody>
+      </p:sp>
+    </p:spTree>
+    <p:extLst>
+      <p:ext uri="{BB962C8B-B14F-4D97-AF65-F5344CB8AC3E}">
+        <p14:creationId xmlns:p14="http://schemas.microsoft.com/office/powerpoint/2010/main" val="2527315513"/>
+      </p:ext>
+    </p:extLst>
+  </p:cSld>
+  <p:clrMapOvr>
+    <a:masterClrMapping/>
+  </p:clrMapOvr>
+</p:sld>
+</file>
+
 <file path=ppt/slides/slide2.xml><?xml version="1.0" encoding="utf-8"?>
 <p:sld xmlns:a="http://schemas.openxmlformats.org/drawingml/2006/main" xmlns:r="http://schemas.openxmlformats.org/officeDocument/2006/relationships" xmlns:p="http://schemas.openxmlformats.org/presentationml/2006/main">
   <p:cSld>
@@ -7755,6 +7958,18 @@
 </file>
 
 <file path=ppt/tags/tag31.xml><?xml version="1.0" encoding="utf-8"?>
+<p:tagLst xmlns:a="http://schemas.openxmlformats.org/drawingml/2006/main" xmlns:r="http://schemas.openxmlformats.org/officeDocument/2006/relationships" xmlns:p="http://schemas.openxmlformats.org/presentationml/2006/main">
+  <p:tag name="_INSTRUCTOR VIEW19C14C36-AC8E-43BC-9DB6-C2AAF774C7DC|PANE__TAG" val="_"/>
+</p:tagLst>
+</file>
+
+<file path=ppt/tags/tag32.xml><?xml version="1.0" encoding="utf-8"?>
+<p:tagLst xmlns:a="http://schemas.openxmlformats.org/drawingml/2006/main" xmlns:r="http://schemas.openxmlformats.org/officeDocument/2006/relationships" xmlns:p="http://schemas.openxmlformats.org/presentationml/2006/main">
+  <p:tag name="_INSTRUCTOR VIEW19C14C36-AC8E-43BC-9DB6-C2AAF774C7DC|PANE__TAG" val="_"/>
+</p:tagLst>
+</file>
+
+<file path=ppt/tags/tag33.xml><?xml version="1.0" encoding="utf-8"?>
 <p:tagLst xmlns:a="http://schemas.openxmlformats.org/drawingml/2006/main" xmlns:r="http://schemas.openxmlformats.org/officeDocument/2006/relationships" xmlns:p="http://schemas.openxmlformats.org/presentationml/2006/main">
   <p:tag name="_INSTRUCTOR VIEW19C14C36-AC8E-43BC-9DB6-C2AAF774C7DC|PANE__TAG" val="_"/>
 </p:tagLst>

</xml_diff>

<commit_message>
online course logistics info
</commit_message>
<xml_diff>
--- a/slides/dailyAnnouncements.pptx
+++ b/slides/dailyAnnouncements.pptx
@@ -5,10 +5,10 @@
     <p:sldMasterId id="2147483728" r:id="rId1"/>
   </p:sldMasterIdLst>
   <p:notesMasterIdLst>
-    <p:notesMasterId r:id="rId20"/>
+    <p:notesMasterId r:id="rId21"/>
   </p:notesMasterIdLst>
   <p:handoutMasterIdLst>
-    <p:handoutMasterId r:id="rId21"/>
+    <p:handoutMasterId r:id="rId22"/>
   </p:handoutMasterIdLst>
   <p:sldIdLst>
     <p:sldId id="447" r:id="rId2"/>
@@ -29,11 +29,12 @@
     <p:sldId id="461" r:id="rId17"/>
     <p:sldId id="462" r:id="rId18"/>
     <p:sldId id="463" r:id="rId19"/>
+    <p:sldId id="464" r:id="rId20"/>
   </p:sldIdLst>
   <p:sldSz cx="9144000" cy="6858000" type="screen4x3"/>
   <p:notesSz cx="7315200" cy="9601200"/>
   <p:custDataLst>
-    <p:tags r:id="rId22"/>
+    <p:tags r:id="rId23"/>
   </p:custDataLst>
   <p:defaultTextStyle>
     <a:defPPr>
@@ -1033,7 +1034,7 @@
             <a:fld id="{E4886CB5-510A-4EF6-9466-BC7A8F0DDE87}" type="datetime1">
               <a:rPr lang="en-US" smtClean="0"/>
               <a:pPr/>
-              <a:t>3/2/20</a:t>
+              <a:t>3/6/20</a:t>
             </a:fld>
             <a:endParaRPr lang="en-US"/>
           </a:p>
@@ -1393,7 +1394,7 @@
             <a:fld id="{9B297853-24B4-4D05-83E4-0AD2E86C55E5}" type="datetime1">
               <a:rPr lang="en-US" smtClean="0"/>
               <a:pPr/>
-              <a:t>3/2/20</a:t>
+              <a:t>3/6/20</a:t>
             </a:fld>
             <a:endParaRPr lang="en-US"/>
           </a:p>
@@ -1569,7 +1570,7 @@
             <a:fld id="{01FCDD9E-5768-4705-9537-0C020B1BB310}" type="datetime1">
               <a:rPr lang="en-US" smtClean="0"/>
               <a:pPr/>
-              <a:t>3/2/20</a:t>
+              <a:t>3/6/20</a:t>
             </a:fld>
             <a:endParaRPr lang="en-US"/>
           </a:p>
@@ -1805,7 +1806,7 @@
             <a:fld id="{4257C27E-59C2-41CA-9776-94955CBEE440}" type="datetime1">
               <a:rPr lang="en-US" smtClean="0"/>
               <a:pPr/>
-              <a:t>3/2/20</a:t>
+              <a:t>3/6/20</a:t>
             </a:fld>
             <a:endParaRPr lang="en-US"/>
           </a:p>
@@ -2091,7 +2092,7 @@
             <a:fld id="{03180747-A137-49C6-9C74-AB7EE86F4904}" type="datetime1">
               <a:rPr lang="en-US" smtClean="0"/>
               <a:pPr/>
-              <a:t>3/2/20</a:t>
+              <a:t>3/6/20</a:t>
             </a:fld>
             <a:endParaRPr lang="en-US"/>
           </a:p>
@@ -2312,7 +2313,7 @@
             <a:fld id="{EBBA31D9-ADC1-480D-86A8-1EAFB6A86A35}" type="datetime1">
               <a:rPr lang="en-US" smtClean="0"/>
               <a:pPr/>
-              <a:t>3/2/20</a:t>
+              <a:t>3/6/20</a:t>
             </a:fld>
             <a:endParaRPr lang="en-US"/>
           </a:p>
@@ -2665,7 +2666,7 @@
             <a:fld id="{80AAE9AE-3B2F-4DEA-8C41-BDDF4CDF6F40}" type="datetime1">
               <a:rPr lang="en-US" smtClean="0"/>
               <a:pPr/>
-              <a:t>3/2/20</a:t>
+              <a:t>3/6/20</a:t>
             </a:fld>
             <a:endParaRPr lang="en-US"/>
           </a:p>
@@ -2898,7 +2899,7 @@
             <a:fld id="{48252F7F-E8FE-413B-8521-D4ED924C6DE5}" type="datetime1">
               <a:rPr lang="en-US" smtClean="0"/>
               <a:pPr/>
-              <a:t>3/2/20</a:t>
+              <a:t>3/6/20</a:t>
             </a:fld>
             <a:endParaRPr lang="en-US"/>
           </a:p>
@@ -3040,7 +3041,7 @@
             <a:fld id="{2FF1B124-70E3-4E4A-90E2-6B55DB7659B3}" type="datetime1">
               <a:rPr lang="en-US" smtClean="0"/>
               <a:pPr/>
-              <a:t>3/2/20</a:t>
+              <a:t>3/6/20</a:t>
             </a:fld>
             <a:endParaRPr lang="en-US"/>
           </a:p>
@@ -3318,7 +3319,7 @@
             <a:fld id="{4EBF4C98-3CD6-4C87-BD40-5718C2628835}" type="datetime1">
               <a:rPr lang="en-US" smtClean="0"/>
               <a:pPr/>
-              <a:t>3/2/20</a:t>
+              <a:t>3/6/20</a:t>
             </a:fld>
             <a:endParaRPr lang="en-US"/>
           </a:p>
@@ -3726,7 +3727,7 @@
             <a:fld id="{6D6408A8-6B1B-4CDA-875E-7BEECDBA31DF}" type="datetime1">
               <a:rPr lang="en-US" smtClean="0"/>
               <a:pPr/>
-              <a:t>3/2/20</a:t>
+              <a:t>3/6/20</a:t>
             </a:fld>
             <a:endParaRPr lang="en-US"/>
           </a:p>
@@ -4064,7 +4065,7 @@
             <a:fld id="{C55AAF07-D2F5-4B3C-B443-40DE8C337A77}" type="datetime1">
               <a:rPr lang="en-US" smtClean="0"/>
               <a:pPr/>
-              <a:t>3/2/20</a:t>
+              <a:t>3/6/20</a:t>
             </a:fld>
             <a:endParaRPr lang="en-US"/>
           </a:p>
@@ -6423,6 +6424,199 @@
 </p:sld>
 </file>
 
+<file path=ppt/slides/slide19.xml><?xml version="1.0" encoding="utf-8"?>
+<p:sld xmlns:a="http://schemas.openxmlformats.org/drawingml/2006/main" xmlns:r="http://schemas.openxmlformats.org/officeDocument/2006/relationships" xmlns:p="http://schemas.openxmlformats.org/presentationml/2006/main">
+  <p:cSld>
+    <p:spTree>
+      <p:nvGrpSpPr>
+        <p:cNvPr id="1" name=""/>
+        <p:cNvGrpSpPr/>
+        <p:nvPr/>
+      </p:nvGrpSpPr>
+      <p:grpSpPr>
+        <a:xfrm>
+          <a:off x="0" y="0"/>
+          <a:ext cx="0" cy="0"/>
+          <a:chOff x="0" y="0"/>
+          <a:chExt cx="0" cy="0"/>
+        </a:xfrm>
+      </p:grpSpPr>
+      <p:sp>
+        <p:nvSpPr>
+          <p:cNvPr id="6146" name="Rectangle 2"/>
+          <p:cNvSpPr>
+            <a:spLocks noGrp="1" noChangeArrowheads="1"/>
+          </p:cNvSpPr>
+          <p:nvPr>
+            <p:ph type="title"/>
+            <p:custDataLst>
+              <p:tags r:id="rId1"/>
+            </p:custDataLst>
+          </p:nvPr>
+        </p:nvSpPr>
+        <p:spPr/>
+        <p:txBody>
+          <a:bodyPr/>
+          <a:lstStyle/>
+          <a:p>
+            <a:pPr algn="ctr"/>
+            <a:r>
+              <a:rPr lang="en-US" dirty="0"/>
+              <a:t>Friday, March 6</a:t>
+            </a:r>
+          </a:p>
+        </p:txBody>
+      </p:sp>
+      <p:sp>
+        <p:nvSpPr>
+          <p:cNvPr id="6147" name="Rectangle 3"/>
+          <p:cNvSpPr>
+            <a:spLocks noGrp="1" noChangeArrowheads="1"/>
+          </p:cNvSpPr>
+          <p:nvPr>
+            <p:ph sz="quarter" idx="1"/>
+            <p:custDataLst>
+              <p:tags r:id="rId2"/>
+            </p:custDataLst>
+          </p:nvPr>
+        </p:nvSpPr>
+        <p:spPr>
+          <a:xfrm>
+            <a:off x="381000" y="1371600"/>
+            <a:ext cx="8255000" cy="5105400"/>
+          </a:xfrm>
+        </p:spPr>
+        <p:txBody>
+          <a:bodyPr>
+            <a:normAutofit fontScale="92500" lnSpcReduction="10000"/>
+          </a:bodyPr>
+          <a:lstStyle/>
+          <a:p>
+            <a:r>
+              <a:rPr lang="en-US" dirty="0"/>
+              <a:t>Exam is graded. Average was 32.74/50</a:t>
+            </a:r>
+          </a:p>
+          <a:p>
+            <a:pPr lvl="1"/>
+            <a:r>
+              <a:rPr lang="en-US" dirty="0"/>
+              <a:t>Max score:	48/50</a:t>
+            </a:r>
+          </a:p>
+          <a:p>
+            <a:pPr lvl="1"/>
+            <a:r>
+              <a:rPr lang="en-US" dirty="0"/>
+              <a:t>n &gt;= 40/50:	16 students</a:t>
+            </a:r>
+          </a:p>
+          <a:p>
+            <a:pPr lvl="1"/>
+            <a:r>
+              <a:rPr lang="en-US" dirty="0"/>
+              <a:t>30 &lt;= n &lt;= 40:	28 students</a:t>
+            </a:r>
+          </a:p>
+          <a:p>
+            <a:pPr lvl="1"/>
+            <a:r>
+              <a:rPr lang="en-US" dirty="0"/>
+              <a:t>n &lt; 30:		21 students</a:t>
+            </a:r>
+          </a:p>
+          <a:p>
+            <a:r>
+              <a:rPr lang="en-US" dirty="0"/>
+              <a:t>You all did pretty well all things considered.</a:t>
+            </a:r>
+          </a:p>
+          <a:p>
+            <a:r>
+              <a:rPr lang="en-US" dirty="0"/>
+              <a:t>Regrade requests? Come to OH and do it in person.</a:t>
+            </a:r>
+          </a:p>
+          <a:p>
+            <a:r>
+              <a:rPr lang="en-US" dirty="0"/>
+              <a:t>Remember there is a </a:t>
+            </a:r>
+            <a:r>
+              <a:rPr lang="en-US" b="1" i="1" dirty="0"/>
+              <a:t>no laptop policy</a:t>
+            </a:r>
+          </a:p>
+          <a:p>
+            <a:r>
+              <a:rPr lang="en-US" dirty="0"/>
+              <a:t>If you are on pace, you should be done with:</a:t>
+            </a:r>
+          </a:p>
+          <a:p>
+            <a:pPr lvl="1"/>
+            <a:r>
+              <a:rPr lang="en-US" dirty="0"/>
+              <a:t>COMPLETED: Graphs – Basic, Find-Union, Graphs – Advanced, Greedy-Basic</a:t>
+            </a:r>
+          </a:p>
+          <a:p>
+            <a:pPr lvl="1"/>
+            <a:r>
+              <a:rPr lang="en-US"/>
+              <a:t>Greedy </a:t>
+            </a:r>
+            <a:r>
+              <a:rPr lang="en-US" dirty="0"/>
+              <a:t>– Advanced is “DUE” today.</a:t>
+            </a:r>
+          </a:p>
+          <a:p>
+            <a:r>
+              <a:rPr lang="en-US" dirty="0"/>
+              <a:t>Today we will go over the exam</a:t>
+            </a:r>
+            <a:endParaRPr lang="en-US" b="1" i="1" dirty="0"/>
+          </a:p>
+        </p:txBody>
+      </p:sp>
+      <p:sp>
+        <p:nvSpPr>
+          <p:cNvPr id="4" name="Slide Number Placeholder 3"/>
+          <p:cNvSpPr>
+            <a:spLocks noGrp="1"/>
+          </p:cNvSpPr>
+          <p:nvPr>
+            <p:ph type="sldNum" sz="quarter" idx="12"/>
+          </p:nvPr>
+        </p:nvSpPr>
+        <p:spPr/>
+        <p:txBody>
+          <a:bodyPr/>
+          <a:lstStyle/>
+          <a:p>
+            <a:fld id="{F26D9103-0C5C-48AC-B68E-3ED2C1647047}" type="slidenum">
+              <a:rPr lang="en-US" smtClean="0"/>
+              <a:pPr/>
+              <a:t>19</a:t>
+            </a:fld>
+            <a:endParaRPr lang="en-US" dirty="0"/>
+          </a:p>
+        </p:txBody>
+      </p:sp>
+    </p:spTree>
+    <p:extLst>
+      <p:ext uri="{BB962C8B-B14F-4D97-AF65-F5344CB8AC3E}">
+        <p14:creationId xmlns:p14="http://schemas.microsoft.com/office/powerpoint/2010/main" val="743538497"/>
+      </p:ext>
+    </p:extLst>
+  </p:cSld>
+  <p:clrMapOvr>
+    <a:masterClrMapping/>
+  </p:clrMapOvr>
+</p:sld>
+</file>
+
 <file path=ppt/slides/slide2.xml><?xml version="1.0" encoding="utf-8"?>
 <p:sld xmlns:a="http://schemas.openxmlformats.org/drawingml/2006/main" xmlns:r="http://schemas.openxmlformats.org/officeDocument/2006/relationships" xmlns:p="http://schemas.openxmlformats.org/presentationml/2006/main">
   <p:cSld>
@@ -8155,6 +8349,18 @@
 </file>
 
 <file path=ppt/tags/tag35.xml><?xml version="1.0" encoding="utf-8"?>
+<p:tagLst xmlns:a="http://schemas.openxmlformats.org/drawingml/2006/main" xmlns:r="http://schemas.openxmlformats.org/officeDocument/2006/relationships" xmlns:p="http://schemas.openxmlformats.org/presentationml/2006/main">
+  <p:tag name="_INSTRUCTOR VIEW19C14C36-AC8E-43BC-9DB6-C2AAF774C7DC|PANE__TAG" val="_"/>
+</p:tagLst>
+</file>
+
+<file path=ppt/tags/tag36.xml><?xml version="1.0" encoding="utf-8"?>
+<p:tagLst xmlns:a="http://schemas.openxmlformats.org/drawingml/2006/main" xmlns:r="http://schemas.openxmlformats.org/officeDocument/2006/relationships" xmlns:p="http://schemas.openxmlformats.org/presentationml/2006/main">
+  <p:tag name="_INSTRUCTOR VIEW19C14C36-AC8E-43BC-9DB6-C2AAF774C7DC|PANE__TAG" val="_"/>
+</p:tagLst>
+</file>
+
+<file path=ppt/tags/tag37.xml><?xml version="1.0" encoding="utf-8"?>
 <p:tagLst xmlns:a="http://schemas.openxmlformats.org/drawingml/2006/main" xmlns:r="http://schemas.openxmlformats.org/officeDocument/2006/relationships" xmlns:p="http://schemas.openxmlformats.org/presentationml/2006/main">
   <p:tag name="_INSTRUCTOR VIEW19C14C36-AC8E-43BC-9DB6-C2AAF774C7DC|PANE__TAG" val="_"/>
 </p:tagLst>

</xml_diff>